<commit_message>
PowerPoint Presentation for project use
</commit_message>
<xml_diff>
--- a/Florida_Electric_Vehicles.pptx
+++ b/Florida_Electric_Vehicles.pptx
@@ -5,23 +5,31 @@
     <p:sldMasterId id="2147483700" r:id="rId1"/>
   </p:sldMasterIdLst>
   <p:notesMasterIdLst>
-    <p:notesMasterId r:id="rId13"/>
+    <p:notesMasterId r:id="rId21"/>
   </p:notesMasterIdLst>
   <p:handoutMasterIdLst>
-    <p:handoutMasterId r:id="rId14"/>
+    <p:handoutMasterId r:id="rId22"/>
   </p:handoutMasterIdLst>
   <p:sldIdLst>
     <p:sldId id="267" r:id="rId2"/>
     <p:sldId id="268" r:id="rId3"/>
-    <p:sldId id="269" r:id="rId4"/>
-    <p:sldId id="270" r:id="rId5"/>
-    <p:sldId id="271" r:id="rId6"/>
-    <p:sldId id="272" r:id="rId7"/>
-    <p:sldId id="273" r:id="rId8"/>
-    <p:sldId id="274" r:id="rId9"/>
-    <p:sldId id="275" r:id="rId10"/>
-    <p:sldId id="276" r:id="rId11"/>
-    <p:sldId id="277" r:id="rId12"/>
+    <p:sldId id="278" r:id="rId4"/>
+    <p:sldId id="279" r:id="rId5"/>
+    <p:sldId id="280" r:id="rId6"/>
+    <p:sldId id="269" r:id="rId7"/>
+    <p:sldId id="282" r:id="rId8"/>
+    <p:sldId id="283" r:id="rId9"/>
+    <p:sldId id="270" r:id="rId10"/>
+    <p:sldId id="271" r:id="rId11"/>
+    <p:sldId id="284" r:id="rId12"/>
+    <p:sldId id="273" r:id="rId13"/>
+    <p:sldId id="274" r:id="rId14"/>
+    <p:sldId id="275" r:id="rId15"/>
+    <p:sldId id="281" r:id="rId16"/>
+    <p:sldId id="285" r:id="rId17"/>
+    <p:sldId id="286" r:id="rId18"/>
+    <p:sldId id="276" r:id="rId19"/>
+    <p:sldId id="277" r:id="rId20"/>
   </p:sldIdLst>
   <p:sldSz cx="12192000" cy="6858000"/>
   <p:notesSz cx="6858000" cy="9144000"/>
@@ -10723,7 +10731,7 @@
       </p:grpSpPr>
       <p:sp>
         <p:nvSpPr>
-          <p:cNvPr id="8" name="Title 7"/>
+          <p:cNvPr id="2" name="Title 1"/>
           <p:cNvSpPr>
             <a:spLocks noGrp="1"/>
           </p:cNvSpPr>
@@ -10738,19 +10746,19 @@
           <a:p>
             <a:r>
               <a:rPr lang="en-US" dirty="0"/>
-              <a:t>Add a Slide Title - 4</a:t>
+              <a:t>Two content layout with SmartArt</a:t>
             </a:r>
           </a:p>
         </p:txBody>
       </p:sp>
       <p:sp>
         <p:nvSpPr>
-          <p:cNvPr id="9" name="Content Placeholder 8"/>
+          <p:cNvPr id="3" name="Content Placeholder 2"/>
           <p:cNvSpPr>
             <a:spLocks noGrp="1"/>
           </p:cNvSpPr>
           <p:nvPr>
-            <p:ph idx="1"/>
+            <p:ph sz="half" idx="1"/>
           </p:nvPr>
         </p:nvSpPr>
         <p:spPr/>
@@ -10758,33 +10766,54 @@
           <a:bodyPr/>
           <a:lstStyle/>
           <a:p>
-            <a:endParaRPr lang="en-US" dirty="0"/>
-          </a:p>
-        </p:txBody>
-      </p:sp>
-      <p:sp>
-        <p:nvSpPr>
-          <p:cNvPr id="10" name="Text Placeholder 9"/>
-          <p:cNvSpPr>
-            <a:spLocks noGrp="1"/>
-          </p:cNvSpPr>
-          <p:nvPr>
-            <p:ph type="body" sz="half" idx="2"/>
-          </p:nvPr>
-        </p:nvSpPr>
-        <p:spPr/>
-        <p:txBody>
-          <a:bodyPr/>
-          <a:lstStyle/>
-          <a:p>
-            <a:endParaRPr lang="en-US" dirty="0"/>
-          </a:p>
-        </p:txBody>
-      </p:sp>
+            <a:r>
+              <a:rPr lang="en-US" dirty="0"/>
+              <a:t>First bullet point here</a:t>
+            </a:r>
+          </a:p>
+          <a:p>
+            <a:r>
+              <a:rPr lang="en-US" dirty="0"/>
+              <a:t>Second bullet point here</a:t>
+            </a:r>
+          </a:p>
+          <a:p>
+            <a:r>
+              <a:rPr lang="en-US" dirty="0"/>
+              <a:t>Third bullet point here</a:t>
+            </a:r>
+          </a:p>
+        </p:txBody>
+      </p:sp>
+      <p:graphicFrame>
+        <p:nvGraphicFramePr>
+          <p:cNvPr id="5" name="Content Placeholder 4" descr="Converging radial diagram showing relationship of 3 steps pointing towards a central goal"/>
+          <p:cNvGraphicFramePr>
+            <a:graphicFrameLocks noGrp="1"/>
+          </p:cNvGraphicFramePr>
+          <p:nvPr>
+            <p:ph sz="half" idx="2"/>
+            <p:extLst>
+              <p:ext uri="{D42A27DB-BD31-4B8C-83A1-F6EECF244321}">
+                <p14:modId xmlns:p14="http://schemas.microsoft.com/office/powerpoint/2010/main" val="1704932073"/>
+              </p:ext>
+            </p:extLst>
+          </p:nvPr>
+        </p:nvGraphicFramePr>
+        <p:xfrm>
+          <a:off x="5089525" y="2160588"/>
+          <a:ext cx="4184650" cy="3881437"/>
+        </p:xfrm>
+        <a:graphic>
+          <a:graphicData uri="http://schemas.openxmlformats.org/drawingml/2006/diagram">
+            <dgm:relIds xmlns:dgm="http://schemas.openxmlformats.org/drawingml/2006/diagram" xmlns:r="http://schemas.openxmlformats.org/officeDocument/2006/relationships" r:dm="rId2" r:lo="rId3" r:qs="rId4" r:cs="rId5"/>
+          </a:graphicData>
+        </a:graphic>
+      </p:graphicFrame>
     </p:spTree>
     <p:extLst>
       <p:ext uri="{BB962C8B-B14F-4D97-AF65-F5344CB8AC3E}">
-        <p14:creationId xmlns:p14="http://schemas.microsoft.com/office/powerpoint/2010/main" val="1669418864"/>
+        <p14:creationId xmlns:p14="http://schemas.microsoft.com/office/powerpoint/2010/main" val="249977872"/>
       </p:ext>
     </p:extLst>
   </p:cSld>
@@ -10823,6 +10852,838 @@
           <a:chExt cx="0" cy="0"/>
         </a:xfrm>
       </p:grpSpPr>
+      <p:pic>
+        <p:nvPicPr>
+          <p:cNvPr id="5" name="Picture 4">
+            <a:extLst>
+              <a:ext uri="{FF2B5EF4-FFF2-40B4-BE49-F238E27FC236}">
+                <a16:creationId xmlns:a16="http://schemas.microsoft.com/office/drawing/2014/main" id="{B868BCB0-39DE-40C3-A4EE-B2AD6E225E2E}"/>
+              </a:ext>
+            </a:extLst>
+          </p:cNvPr>
+          <p:cNvPicPr>
+            <a:picLocks noChangeAspect="1"/>
+          </p:cNvPicPr>
+          <p:nvPr/>
+        </p:nvPicPr>
+        <p:blipFill rotWithShape="1">
+          <a:blip r:embed="rId2"/>
+          <a:srcRect b="6316"/>
+          <a:stretch/>
+        </p:blipFill>
+        <p:spPr>
+          <a:xfrm>
+            <a:off x="0" y="0"/>
+            <a:ext cx="12192000" cy="6857999"/>
+          </a:xfrm>
+          <a:prstGeom prst="rect">
+            <a:avLst/>
+          </a:prstGeom>
+        </p:spPr>
+      </p:pic>
+      <p:sp>
+        <p:nvSpPr>
+          <p:cNvPr id="2" name="Title 1">
+            <a:extLst>
+              <a:ext uri="{FF2B5EF4-FFF2-40B4-BE49-F238E27FC236}">
+                <a16:creationId xmlns:a16="http://schemas.microsoft.com/office/drawing/2014/main" id="{E692F99F-6503-405D-83EC-27DF8276EE28}"/>
+              </a:ext>
+            </a:extLst>
+          </p:cNvPr>
+          <p:cNvSpPr>
+            <a:spLocks noGrp="1"/>
+          </p:cNvSpPr>
+          <p:nvPr>
+            <p:ph type="title"/>
+          </p:nvPr>
+        </p:nvSpPr>
+        <p:spPr>
+          <a:xfrm>
+            <a:off x="3028950" y="1196182"/>
+            <a:ext cx="6134100" cy="1499393"/>
+          </a:xfrm>
+        </p:spPr>
+        <p:txBody>
+          <a:bodyPr>
+            <a:normAutofit/>
+          </a:bodyPr>
+          <a:lstStyle/>
+          <a:p>
+            <a:pPr algn="ctr"/>
+            <a:r>
+              <a:rPr lang="en-US" sz="4400" b="1" dirty="0"/>
+              <a:t>EV Cars </a:t>
+            </a:r>
+            <a:br>
+              <a:rPr lang="en-US" sz="4400" b="1" dirty="0"/>
+            </a:br>
+            <a:r>
+              <a:rPr lang="en-US" sz="4400" b="1" dirty="0"/>
+              <a:t>Environmental Impact</a:t>
+            </a:r>
+          </a:p>
+        </p:txBody>
+      </p:sp>
+    </p:spTree>
+    <p:extLst>
+      <p:ext uri="{BB962C8B-B14F-4D97-AF65-F5344CB8AC3E}">
+        <p14:creationId xmlns:p14="http://schemas.microsoft.com/office/powerpoint/2010/main" val="2765011733"/>
+      </p:ext>
+    </p:extLst>
+  </p:cSld>
+  <p:clrMapOvr>
+    <a:masterClrMapping/>
+  </p:clrMapOvr>
+  <mc:AlternateContent xmlns:mc="http://schemas.openxmlformats.org/markup-compatibility/2006" xmlns:p14="http://schemas.microsoft.com/office/powerpoint/2010/main">
+    <mc:Choice Requires="p14">
+      <p:transition spd="med" p14:dur="700">
+        <p:fade/>
+      </p:transition>
+    </mc:Choice>
+    <mc:Fallback xmlns="">
+      <p:transition spd="med">
+        <p:fade/>
+      </p:transition>
+    </mc:Fallback>
+  </mc:AlternateContent>
+</p:sld>
+</file>
+
+<file path=ppt/slides/slide12.xml><?xml version="1.0" encoding="utf-8"?>
+<p:sld xmlns:a="http://schemas.openxmlformats.org/drawingml/2006/main" xmlns:r="http://schemas.openxmlformats.org/officeDocument/2006/relationships" xmlns:p="http://schemas.openxmlformats.org/presentationml/2006/main">
+  <p:cSld>
+    <p:spTree>
+      <p:nvGrpSpPr>
+        <p:cNvPr id="1" name=""/>
+        <p:cNvGrpSpPr/>
+        <p:nvPr/>
+      </p:nvGrpSpPr>
+      <p:grpSpPr>
+        <a:xfrm>
+          <a:off x="0" y="0"/>
+          <a:ext cx="0" cy="0"/>
+          <a:chOff x="0" y="0"/>
+          <a:chExt cx="0" cy="0"/>
+        </a:xfrm>
+      </p:grpSpPr>
+      <p:sp>
+        <p:nvSpPr>
+          <p:cNvPr id="12" name="Title 11"/>
+          <p:cNvSpPr>
+            <a:spLocks noGrp="1"/>
+          </p:cNvSpPr>
+          <p:nvPr>
+            <p:ph type="title"/>
+          </p:nvPr>
+        </p:nvSpPr>
+        <p:spPr/>
+        <p:txBody>
+          <a:bodyPr/>
+          <a:lstStyle/>
+          <a:p>
+            <a:r>
+              <a:rPr lang="en-US" dirty="0"/>
+              <a:t>Add a Slide Title - 2</a:t>
+            </a:r>
+          </a:p>
+        </p:txBody>
+      </p:sp>
+      <p:sp>
+        <p:nvSpPr>
+          <p:cNvPr id="13" name="Text Placeholder 12"/>
+          <p:cNvSpPr>
+            <a:spLocks noGrp="1"/>
+          </p:cNvSpPr>
+          <p:nvPr>
+            <p:ph type="body" idx="1"/>
+          </p:nvPr>
+        </p:nvSpPr>
+        <p:spPr/>
+        <p:txBody>
+          <a:bodyPr/>
+          <a:lstStyle/>
+          <a:p>
+            <a:endParaRPr lang="en-US" dirty="0"/>
+          </a:p>
+        </p:txBody>
+      </p:sp>
+      <p:sp>
+        <p:nvSpPr>
+          <p:cNvPr id="14" name="Content Placeholder 13"/>
+          <p:cNvSpPr>
+            <a:spLocks noGrp="1"/>
+          </p:cNvSpPr>
+          <p:nvPr>
+            <p:ph sz="half" idx="2"/>
+          </p:nvPr>
+        </p:nvSpPr>
+        <p:spPr/>
+        <p:txBody>
+          <a:bodyPr/>
+          <a:lstStyle/>
+          <a:p>
+            <a:endParaRPr lang="en-US" dirty="0"/>
+          </a:p>
+        </p:txBody>
+      </p:sp>
+      <p:sp>
+        <p:nvSpPr>
+          <p:cNvPr id="15" name="Text Placeholder 14"/>
+          <p:cNvSpPr>
+            <a:spLocks noGrp="1"/>
+          </p:cNvSpPr>
+          <p:nvPr>
+            <p:ph type="body" sz="quarter" idx="3"/>
+          </p:nvPr>
+        </p:nvSpPr>
+        <p:spPr/>
+        <p:txBody>
+          <a:bodyPr/>
+          <a:lstStyle/>
+          <a:p>
+            <a:endParaRPr lang="en-US" dirty="0"/>
+          </a:p>
+        </p:txBody>
+      </p:sp>
+      <p:sp>
+        <p:nvSpPr>
+          <p:cNvPr id="16" name="Content Placeholder 15"/>
+          <p:cNvSpPr>
+            <a:spLocks noGrp="1"/>
+          </p:cNvSpPr>
+          <p:nvPr>
+            <p:ph sz="quarter" idx="4"/>
+          </p:nvPr>
+        </p:nvSpPr>
+        <p:spPr/>
+        <p:txBody>
+          <a:bodyPr/>
+          <a:lstStyle/>
+          <a:p>
+            <a:endParaRPr lang="en-US" dirty="0"/>
+          </a:p>
+        </p:txBody>
+      </p:sp>
+    </p:spTree>
+    <p:extLst>
+      <p:ext uri="{BB962C8B-B14F-4D97-AF65-F5344CB8AC3E}">
+        <p14:creationId xmlns:p14="http://schemas.microsoft.com/office/powerpoint/2010/main" val="1428607047"/>
+      </p:ext>
+    </p:extLst>
+  </p:cSld>
+  <p:clrMapOvr>
+    <a:masterClrMapping/>
+  </p:clrMapOvr>
+  <mc:AlternateContent xmlns:mc="http://schemas.openxmlformats.org/markup-compatibility/2006" xmlns:p14="http://schemas.microsoft.com/office/powerpoint/2010/main">
+    <mc:Choice Requires="p14">
+      <p:transition spd="med" p14:dur="700">
+        <p:fade/>
+      </p:transition>
+    </mc:Choice>
+    <mc:Fallback xmlns="">
+      <p:transition spd="med">
+        <p:fade/>
+      </p:transition>
+    </mc:Fallback>
+  </mc:AlternateContent>
+</p:sld>
+</file>
+
+<file path=ppt/slides/slide13.xml><?xml version="1.0" encoding="utf-8"?>
+<p:sld xmlns:a="http://schemas.openxmlformats.org/drawingml/2006/main" xmlns:r="http://schemas.openxmlformats.org/officeDocument/2006/relationships" xmlns:p="http://schemas.openxmlformats.org/presentationml/2006/main">
+  <p:cSld>
+    <p:spTree>
+      <p:nvGrpSpPr>
+        <p:cNvPr id="1" name=""/>
+        <p:cNvGrpSpPr/>
+        <p:nvPr/>
+      </p:nvGrpSpPr>
+      <p:grpSpPr>
+        <a:xfrm>
+          <a:off x="0" y="0"/>
+          <a:ext cx="0" cy="0"/>
+          <a:chOff x="0" y="0"/>
+          <a:chExt cx="0" cy="0"/>
+        </a:xfrm>
+      </p:grpSpPr>
+      <p:sp>
+        <p:nvSpPr>
+          <p:cNvPr id="4" name="Title 3"/>
+          <p:cNvSpPr>
+            <a:spLocks noGrp="1"/>
+          </p:cNvSpPr>
+          <p:nvPr>
+            <p:ph type="title"/>
+          </p:nvPr>
+        </p:nvSpPr>
+        <p:spPr/>
+        <p:txBody>
+          <a:bodyPr/>
+          <a:lstStyle/>
+          <a:p>
+            <a:r>
+              <a:rPr lang="en-US" dirty="0"/>
+              <a:t>Add a Slide Title - 3</a:t>
+            </a:r>
+          </a:p>
+        </p:txBody>
+      </p:sp>
+    </p:spTree>
+    <p:extLst>
+      <p:ext uri="{BB962C8B-B14F-4D97-AF65-F5344CB8AC3E}">
+        <p14:creationId xmlns:p14="http://schemas.microsoft.com/office/powerpoint/2010/main" val="3757355931"/>
+      </p:ext>
+    </p:extLst>
+  </p:cSld>
+  <p:clrMapOvr>
+    <a:masterClrMapping/>
+  </p:clrMapOvr>
+  <mc:AlternateContent xmlns:mc="http://schemas.openxmlformats.org/markup-compatibility/2006" xmlns:p14="http://schemas.microsoft.com/office/powerpoint/2010/main">
+    <mc:Choice Requires="p14">
+      <p:transition spd="med" p14:dur="700">
+        <p:fade/>
+      </p:transition>
+    </mc:Choice>
+    <mc:Fallback xmlns="">
+      <p:transition spd="med">
+        <p:fade/>
+      </p:transition>
+    </mc:Fallback>
+  </mc:AlternateContent>
+</p:sld>
+</file>
+
+<file path=ppt/slides/slide14.xml><?xml version="1.0" encoding="utf-8"?>
+<p:sld xmlns:a="http://schemas.openxmlformats.org/drawingml/2006/main" xmlns:r="http://schemas.openxmlformats.org/officeDocument/2006/relationships" xmlns:p="http://schemas.openxmlformats.org/presentationml/2006/main">
+  <p:cSld>
+    <p:spTree>
+      <p:nvGrpSpPr>
+        <p:cNvPr id="1" name=""/>
+        <p:cNvGrpSpPr/>
+        <p:nvPr/>
+      </p:nvGrpSpPr>
+      <p:grpSpPr>
+        <a:xfrm>
+          <a:off x="0" y="0"/>
+          <a:ext cx="0" cy="0"/>
+          <a:chOff x="0" y="0"/>
+          <a:chExt cx="0" cy="0"/>
+        </a:xfrm>
+      </p:grpSpPr>
+      <p:sp>
+        <p:nvSpPr>
+          <p:cNvPr id="3" name="Title 1">
+            <a:extLst>
+              <a:ext uri="{FF2B5EF4-FFF2-40B4-BE49-F238E27FC236}">
+                <a16:creationId xmlns:a16="http://schemas.microsoft.com/office/drawing/2014/main" id="{D999B5B6-13F8-4590-846A-34F73B063C5D}"/>
+              </a:ext>
+            </a:extLst>
+          </p:cNvPr>
+          <p:cNvSpPr txBox="1">
+            <a:spLocks/>
+          </p:cNvSpPr>
+          <p:nvPr/>
+        </p:nvSpPr>
+        <p:spPr>
+          <a:xfrm>
+            <a:off x="1076325" y="577057"/>
+            <a:ext cx="8067675" cy="1499393"/>
+          </a:xfrm>
+          <a:prstGeom prst="rect">
+            <a:avLst/>
+          </a:prstGeom>
+        </p:spPr>
+        <p:txBody>
+          <a:bodyPr>
+            <a:normAutofit/>
+          </a:bodyPr>
+          <a:lstStyle>
+            <a:lvl1pPr algn="l" defTabSz="457200" rtl="0" eaLnBrk="1" latinLnBrk="0" hangingPunct="1">
+              <a:spcBef>
+                <a:spcPct val="0"/>
+              </a:spcBef>
+              <a:buNone/>
+              <a:defRPr sz="3600" kern="1200">
+                <a:solidFill>
+                  <a:schemeClr val="accent1"/>
+                </a:solidFill>
+                <a:latin typeface="+mj-lt"/>
+                <a:ea typeface="+mj-ea"/>
+                <a:cs typeface="+mj-cs"/>
+              </a:defRPr>
+            </a:lvl1pPr>
+            <a:lvl2pPr eaLnBrk="1" hangingPunct="1">
+              <a:defRPr>
+                <a:solidFill>
+                  <a:schemeClr val="tx2"/>
+                </a:solidFill>
+              </a:defRPr>
+            </a:lvl2pPr>
+            <a:lvl3pPr eaLnBrk="1" hangingPunct="1">
+              <a:defRPr>
+                <a:solidFill>
+                  <a:schemeClr val="tx2"/>
+                </a:solidFill>
+              </a:defRPr>
+            </a:lvl3pPr>
+            <a:lvl4pPr eaLnBrk="1" hangingPunct="1">
+              <a:defRPr>
+                <a:solidFill>
+                  <a:schemeClr val="tx2"/>
+                </a:solidFill>
+              </a:defRPr>
+            </a:lvl4pPr>
+            <a:lvl5pPr eaLnBrk="1" hangingPunct="1">
+              <a:defRPr>
+                <a:solidFill>
+                  <a:schemeClr val="tx2"/>
+                </a:solidFill>
+              </a:defRPr>
+            </a:lvl5pPr>
+            <a:lvl6pPr eaLnBrk="1" hangingPunct="1">
+              <a:defRPr>
+                <a:solidFill>
+                  <a:schemeClr val="tx2"/>
+                </a:solidFill>
+              </a:defRPr>
+            </a:lvl6pPr>
+            <a:lvl7pPr eaLnBrk="1" hangingPunct="1">
+              <a:defRPr>
+                <a:solidFill>
+                  <a:schemeClr val="tx2"/>
+                </a:solidFill>
+              </a:defRPr>
+            </a:lvl7pPr>
+            <a:lvl8pPr eaLnBrk="1" hangingPunct="1">
+              <a:defRPr>
+                <a:solidFill>
+                  <a:schemeClr val="tx2"/>
+                </a:solidFill>
+              </a:defRPr>
+            </a:lvl8pPr>
+            <a:lvl9pPr eaLnBrk="1" hangingPunct="1">
+              <a:defRPr>
+                <a:solidFill>
+                  <a:schemeClr val="tx2"/>
+                </a:solidFill>
+              </a:defRPr>
+            </a:lvl9pPr>
+          </a:lstStyle>
+          <a:p>
+            <a:pPr algn="ctr"/>
+            <a:r>
+              <a:rPr lang="en-US" sz="4400" b="1" dirty="0"/>
+              <a:t>EV Cars </a:t>
+            </a:r>
+            <a:br>
+              <a:rPr lang="en-US" sz="4400" b="1" dirty="0"/>
+            </a:br>
+            <a:r>
+              <a:rPr lang="en-US" sz="4400" b="1" dirty="0"/>
+              <a:t>Charging Stations in Florida</a:t>
+            </a:r>
+          </a:p>
+        </p:txBody>
+      </p:sp>
+      <p:pic>
+        <p:nvPicPr>
+          <p:cNvPr id="5" name="Picture 4">
+            <a:extLst>
+              <a:ext uri="{FF2B5EF4-FFF2-40B4-BE49-F238E27FC236}">
+                <a16:creationId xmlns:a16="http://schemas.microsoft.com/office/drawing/2014/main" id="{1667C89B-A909-479C-A5EE-57AA56DBD34A}"/>
+              </a:ext>
+            </a:extLst>
+          </p:cNvPr>
+          <p:cNvPicPr>
+            <a:picLocks noChangeAspect="1"/>
+          </p:cNvPicPr>
+          <p:nvPr/>
+        </p:nvPicPr>
+        <p:blipFill>
+          <a:blip r:embed="rId2"/>
+          <a:stretch>
+            <a:fillRect/>
+          </a:stretch>
+        </p:blipFill>
+        <p:spPr>
+          <a:xfrm>
+            <a:off x="1647824" y="2704305"/>
+            <a:ext cx="7153275" cy="3576638"/>
+          </a:xfrm>
+          <a:prstGeom prst="rect">
+            <a:avLst/>
+          </a:prstGeom>
+        </p:spPr>
+      </p:pic>
+    </p:spTree>
+    <p:extLst>
+      <p:ext uri="{BB962C8B-B14F-4D97-AF65-F5344CB8AC3E}">
+        <p14:creationId xmlns:p14="http://schemas.microsoft.com/office/powerpoint/2010/main" val="726169185"/>
+      </p:ext>
+    </p:extLst>
+  </p:cSld>
+  <p:clrMapOvr>
+    <a:masterClrMapping/>
+  </p:clrMapOvr>
+  <mc:AlternateContent xmlns:mc="http://schemas.openxmlformats.org/markup-compatibility/2006" xmlns:p14="http://schemas.microsoft.com/office/powerpoint/2010/main">
+    <mc:Choice Requires="p14">
+      <p:transition spd="med" p14:dur="700">
+        <p:fade/>
+      </p:transition>
+    </mc:Choice>
+    <mc:Fallback xmlns="">
+      <p:transition spd="med">
+        <p:fade/>
+      </p:transition>
+    </mc:Fallback>
+  </mc:AlternateContent>
+</p:sld>
+</file>
+
+<file path=ppt/slides/slide15.xml><?xml version="1.0" encoding="utf-8"?>
+<p:sld xmlns:a="http://schemas.openxmlformats.org/drawingml/2006/main" xmlns:r="http://schemas.openxmlformats.org/officeDocument/2006/relationships" xmlns:p="http://schemas.openxmlformats.org/presentationml/2006/main">
+  <p:cSld>
+    <p:spTree>
+      <p:nvGrpSpPr>
+        <p:cNvPr id="1" name=""/>
+        <p:cNvGrpSpPr/>
+        <p:nvPr/>
+      </p:nvGrpSpPr>
+      <p:grpSpPr>
+        <a:xfrm>
+          <a:off x="0" y="0"/>
+          <a:ext cx="0" cy="0"/>
+          <a:chOff x="0" y="0"/>
+          <a:chExt cx="0" cy="0"/>
+        </a:xfrm>
+      </p:grpSpPr>
+      <p:pic>
+        <p:nvPicPr>
+          <p:cNvPr id="5" name="Picture 4">
+            <a:extLst>
+              <a:ext uri="{FF2B5EF4-FFF2-40B4-BE49-F238E27FC236}">
+                <a16:creationId xmlns:a16="http://schemas.microsoft.com/office/drawing/2014/main" id="{25B852C5-7C6D-4C26-9141-99C6F5F4D0E3}"/>
+              </a:ext>
+            </a:extLst>
+          </p:cNvPr>
+          <p:cNvPicPr>
+            <a:picLocks noChangeAspect="1"/>
+          </p:cNvPicPr>
+          <p:nvPr/>
+        </p:nvPicPr>
+        <p:blipFill>
+          <a:blip r:embed="rId2"/>
+          <a:stretch>
+            <a:fillRect/>
+          </a:stretch>
+        </p:blipFill>
+        <p:spPr>
+          <a:xfrm>
+            <a:off x="0" y="8841"/>
+            <a:ext cx="8991600" cy="6906309"/>
+          </a:xfrm>
+          <a:prstGeom prst="rect">
+            <a:avLst/>
+          </a:prstGeom>
+        </p:spPr>
+      </p:pic>
+      <p:sp>
+        <p:nvSpPr>
+          <p:cNvPr id="3" name="TextBox 2">
+            <a:extLst>
+              <a:ext uri="{FF2B5EF4-FFF2-40B4-BE49-F238E27FC236}">
+                <a16:creationId xmlns:a16="http://schemas.microsoft.com/office/drawing/2014/main" id="{BC2503CD-2066-411E-A235-F060EE4221F6}"/>
+              </a:ext>
+            </a:extLst>
+          </p:cNvPr>
+          <p:cNvSpPr txBox="1"/>
+          <p:nvPr/>
+        </p:nvSpPr>
+        <p:spPr>
+          <a:xfrm>
+            <a:off x="2519362" y="1134159"/>
+            <a:ext cx="4757737" cy="1569660"/>
+          </a:xfrm>
+          <a:prstGeom prst="rect">
+            <a:avLst/>
+          </a:prstGeom>
+          <a:noFill/>
+        </p:spPr>
+        <p:txBody>
+          <a:bodyPr wrap="square">
+            <a:spAutoFit/>
+          </a:bodyPr>
+          <a:lstStyle/>
+          <a:p>
+            <a:pPr algn="ctr"/>
+            <a:r>
+              <a:rPr lang="en-US" sz="4800" b="1" dirty="0">
+                <a:solidFill>
+                  <a:schemeClr val="accent2">
+                    <a:lumMod val="60000"/>
+                    <a:lumOff val="40000"/>
+                  </a:schemeClr>
+                </a:solidFill>
+              </a:rPr>
+              <a:t>Florida EV Cars Website</a:t>
+            </a:r>
+            <a:endParaRPr lang="en-US" sz="4800" dirty="0">
+              <a:solidFill>
+                <a:schemeClr val="accent2">
+                  <a:lumMod val="60000"/>
+                  <a:lumOff val="40000"/>
+                </a:schemeClr>
+              </a:solidFill>
+            </a:endParaRPr>
+          </a:p>
+        </p:txBody>
+      </p:sp>
+    </p:spTree>
+    <p:extLst>
+      <p:ext uri="{BB962C8B-B14F-4D97-AF65-F5344CB8AC3E}">
+        <p14:creationId xmlns:p14="http://schemas.microsoft.com/office/powerpoint/2010/main" val="1464733085"/>
+      </p:ext>
+    </p:extLst>
+  </p:cSld>
+  <p:clrMapOvr>
+    <a:masterClrMapping/>
+  </p:clrMapOvr>
+  <mc:AlternateContent xmlns:mc="http://schemas.openxmlformats.org/markup-compatibility/2006" xmlns:p14="http://schemas.microsoft.com/office/powerpoint/2010/main">
+    <mc:Choice Requires="p14">
+      <p:transition spd="med" p14:dur="700">
+        <p:fade/>
+      </p:transition>
+    </mc:Choice>
+    <mc:Fallback xmlns="">
+      <p:transition spd="med">
+        <p:fade/>
+      </p:transition>
+    </mc:Fallback>
+  </mc:AlternateContent>
+</p:sld>
+</file>
+
+<file path=ppt/slides/slide16.xml><?xml version="1.0" encoding="utf-8"?>
+<p:sld xmlns:a="http://schemas.openxmlformats.org/drawingml/2006/main" xmlns:r="http://schemas.openxmlformats.org/officeDocument/2006/relationships" xmlns:p="http://schemas.openxmlformats.org/presentationml/2006/main">
+  <p:cSld>
+    <p:spTree>
+      <p:nvGrpSpPr>
+        <p:cNvPr id="1" name=""/>
+        <p:cNvGrpSpPr/>
+        <p:nvPr/>
+      </p:nvGrpSpPr>
+      <p:grpSpPr>
+        <a:xfrm>
+          <a:off x="0" y="0"/>
+          <a:ext cx="0" cy="0"/>
+          <a:chOff x="0" y="0"/>
+          <a:chExt cx="0" cy="0"/>
+        </a:xfrm>
+      </p:grpSpPr>
+    </p:spTree>
+    <p:extLst>
+      <p:ext uri="{BB962C8B-B14F-4D97-AF65-F5344CB8AC3E}">
+        <p14:creationId xmlns:p14="http://schemas.microsoft.com/office/powerpoint/2010/main" val="978754131"/>
+      </p:ext>
+    </p:extLst>
+  </p:cSld>
+  <p:clrMapOvr>
+    <a:masterClrMapping/>
+  </p:clrMapOvr>
+  <mc:AlternateContent xmlns:mc="http://schemas.openxmlformats.org/markup-compatibility/2006" xmlns:p14="http://schemas.microsoft.com/office/powerpoint/2010/main">
+    <mc:Choice Requires="p14">
+      <p:transition spd="med" p14:dur="700">
+        <p:fade/>
+      </p:transition>
+    </mc:Choice>
+    <mc:Fallback xmlns="">
+      <p:transition spd="med">
+        <p:fade/>
+      </p:transition>
+    </mc:Fallback>
+  </mc:AlternateContent>
+</p:sld>
+</file>
+
+<file path=ppt/slides/slide17.xml><?xml version="1.0" encoding="utf-8"?>
+<p:sld xmlns:a="http://schemas.openxmlformats.org/drawingml/2006/main" xmlns:r="http://schemas.openxmlformats.org/officeDocument/2006/relationships" xmlns:p="http://schemas.openxmlformats.org/presentationml/2006/main">
+  <p:cSld>
+    <p:spTree>
+      <p:nvGrpSpPr>
+        <p:cNvPr id="1" name=""/>
+        <p:cNvGrpSpPr/>
+        <p:nvPr/>
+      </p:nvGrpSpPr>
+      <p:grpSpPr>
+        <a:xfrm>
+          <a:off x="0" y="0"/>
+          <a:ext cx="0" cy="0"/>
+          <a:chOff x="0" y="0"/>
+          <a:chExt cx="0" cy="0"/>
+        </a:xfrm>
+      </p:grpSpPr>
+      <p:pic>
+        <p:nvPicPr>
+          <p:cNvPr id="3" name="Picture 2">
+            <a:extLst>
+              <a:ext uri="{FF2B5EF4-FFF2-40B4-BE49-F238E27FC236}">
+                <a16:creationId xmlns:a16="http://schemas.microsoft.com/office/drawing/2014/main" id="{4D648841-74B6-4E9A-8328-8DFBCEE7F3D5}"/>
+              </a:ext>
+            </a:extLst>
+          </p:cNvPr>
+          <p:cNvPicPr>
+            <a:picLocks noChangeAspect="1"/>
+          </p:cNvPicPr>
+          <p:nvPr/>
+        </p:nvPicPr>
+        <p:blipFill>
+          <a:blip r:embed="rId2"/>
+          <a:stretch>
+            <a:fillRect/>
+          </a:stretch>
+        </p:blipFill>
+        <p:spPr>
+          <a:xfrm>
+            <a:off x="3457575" y="3957637"/>
+            <a:ext cx="3657600" cy="2438400"/>
+          </a:xfrm>
+          <a:prstGeom prst="rect">
+            <a:avLst/>
+          </a:prstGeom>
+        </p:spPr>
+      </p:pic>
+      <p:pic>
+        <p:nvPicPr>
+          <p:cNvPr id="5" name="Picture 4">
+            <a:extLst>
+              <a:ext uri="{FF2B5EF4-FFF2-40B4-BE49-F238E27FC236}">
+                <a16:creationId xmlns:a16="http://schemas.microsoft.com/office/drawing/2014/main" id="{2357ECEB-7B2B-46A8-A529-5A2C55589449}"/>
+              </a:ext>
+            </a:extLst>
+          </p:cNvPr>
+          <p:cNvPicPr>
+            <a:picLocks noChangeAspect="1"/>
+          </p:cNvPicPr>
+          <p:nvPr/>
+        </p:nvPicPr>
+        <p:blipFill>
+          <a:blip r:embed="rId3"/>
+          <a:stretch>
+            <a:fillRect/>
+          </a:stretch>
+        </p:blipFill>
+        <p:spPr>
+          <a:xfrm>
+            <a:off x="390524" y="371475"/>
+            <a:ext cx="5191522" cy="3429000"/>
+          </a:xfrm>
+          <a:prstGeom prst="rect">
+            <a:avLst/>
+          </a:prstGeom>
+        </p:spPr>
+      </p:pic>
+      <p:pic>
+        <p:nvPicPr>
+          <p:cNvPr id="7" name="Picture 6">
+            <a:extLst>
+              <a:ext uri="{FF2B5EF4-FFF2-40B4-BE49-F238E27FC236}">
+                <a16:creationId xmlns:a16="http://schemas.microsoft.com/office/drawing/2014/main" id="{8A151651-E5B5-4EE1-B0E4-DAC59A196D9F}"/>
+              </a:ext>
+            </a:extLst>
+          </p:cNvPr>
+          <p:cNvPicPr>
+            <a:picLocks noChangeAspect="1"/>
+          </p:cNvPicPr>
+          <p:nvPr/>
+        </p:nvPicPr>
+        <p:blipFill>
+          <a:blip r:embed="rId4"/>
+          <a:stretch>
+            <a:fillRect/>
+          </a:stretch>
+        </p:blipFill>
+        <p:spPr>
+          <a:xfrm>
+            <a:off x="5934075" y="371475"/>
+            <a:ext cx="4376977" cy="3238705"/>
+          </a:xfrm>
+          <a:prstGeom prst="rect">
+            <a:avLst/>
+          </a:prstGeom>
+        </p:spPr>
+      </p:pic>
+      <p:pic>
+        <p:nvPicPr>
+          <p:cNvPr id="9" name="Picture 8">
+            <a:extLst>
+              <a:ext uri="{FF2B5EF4-FFF2-40B4-BE49-F238E27FC236}">
+                <a16:creationId xmlns:a16="http://schemas.microsoft.com/office/drawing/2014/main" id="{72B8907C-B9FA-4A2C-8359-70E006D320E5}"/>
+              </a:ext>
+            </a:extLst>
+          </p:cNvPr>
+          <p:cNvPicPr>
+            <a:picLocks noChangeAspect="1"/>
+          </p:cNvPicPr>
+          <p:nvPr/>
+        </p:nvPicPr>
+        <p:blipFill>
+          <a:blip r:embed="rId5"/>
+          <a:stretch>
+            <a:fillRect/>
+          </a:stretch>
+        </p:blipFill>
+        <p:spPr>
+          <a:xfrm>
+            <a:off x="528637" y="4252912"/>
+            <a:ext cx="2828925" cy="1609725"/>
+          </a:xfrm>
+          <a:prstGeom prst="rect">
+            <a:avLst/>
+          </a:prstGeom>
+        </p:spPr>
+      </p:pic>
+    </p:spTree>
+    <p:extLst>
+      <p:ext uri="{BB962C8B-B14F-4D97-AF65-F5344CB8AC3E}">
+        <p14:creationId xmlns:p14="http://schemas.microsoft.com/office/powerpoint/2010/main" val="790883198"/>
+      </p:ext>
+    </p:extLst>
+  </p:cSld>
+  <p:clrMapOvr>
+    <a:masterClrMapping/>
+  </p:clrMapOvr>
+  <mc:AlternateContent xmlns:mc="http://schemas.openxmlformats.org/markup-compatibility/2006" xmlns:p14="http://schemas.microsoft.com/office/powerpoint/2010/main">
+    <mc:Choice Requires="p14">
+      <p:transition spd="med" p14:dur="700">
+        <p:fade/>
+      </p:transition>
+    </mc:Choice>
+    <mc:Fallback xmlns="">
+      <p:transition spd="med">
+        <p:fade/>
+      </p:transition>
+    </mc:Fallback>
+  </mc:AlternateContent>
+</p:sld>
+</file>
+
+<file path=ppt/slides/slide18.xml><?xml version="1.0" encoding="utf-8"?>
+<p:sld xmlns:a="http://schemas.openxmlformats.org/drawingml/2006/main" xmlns:r="http://schemas.openxmlformats.org/officeDocument/2006/relationships" xmlns:p="http://schemas.openxmlformats.org/presentationml/2006/main">
+  <p:cSld>
+    <p:spTree>
+      <p:nvGrpSpPr>
+        <p:cNvPr id="1" name=""/>
+        <p:cNvGrpSpPr/>
+        <p:nvPr/>
+      </p:nvGrpSpPr>
+      <p:grpSpPr>
+        <a:xfrm>
+          <a:off x="0" y="0"/>
+          <a:ext cx="0" cy="0"/>
+          <a:chOff x="0" y="0"/>
+          <a:chExt cx="0" cy="0"/>
+        </a:xfrm>
+      </p:grpSpPr>
       <p:sp>
         <p:nvSpPr>
           <p:cNvPr id="8" name="Title 7"/>
@@ -10840,23 +11701,143 @@
           <a:p>
             <a:r>
               <a:rPr lang="en-US" dirty="0"/>
-              <a:t>Add a Slide Title - 5</a:t>
+              <a:t>Add a Slide Title - 4</a:t>
             </a:r>
           </a:p>
         </p:txBody>
       </p:sp>
       <p:sp>
         <p:nvSpPr>
-          <p:cNvPr id="9" name="Picture Placeholder 8" descr="An empty placeholder to add an image. Click on the placeholder and select the image that you wish to add"/>
+          <p:cNvPr id="9" name="Content Placeholder 8"/>
           <p:cNvSpPr>
             <a:spLocks noGrp="1"/>
           </p:cNvSpPr>
           <p:nvPr>
+            <p:ph idx="1"/>
+          </p:nvPr>
+        </p:nvSpPr>
+        <p:spPr/>
+        <p:txBody>
+          <a:bodyPr/>
+          <a:lstStyle/>
+          <a:p>
+            <a:endParaRPr lang="en-US" dirty="0"/>
+          </a:p>
+        </p:txBody>
+      </p:sp>
+      <p:sp>
+        <p:nvSpPr>
+          <p:cNvPr id="10" name="Text Placeholder 9"/>
+          <p:cNvSpPr>
+            <a:spLocks noGrp="1"/>
+          </p:cNvSpPr>
+          <p:nvPr>
+            <p:ph type="body" sz="half" idx="2"/>
+          </p:nvPr>
+        </p:nvSpPr>
+        <p:spPr/>
+        <p:txBody>
+          <a:bodyPr/>
+          <a:lstStyle/>
+          <a:p>
+            <a:endParaRPr lang="en-US" dirty="0"/>
+          </a:p>
+        </p:txBody>
+      </p:sp>
+    </p:spTree>
+    <p:extLst>
+      <p:ext uri="{BB962C8B-B14F-4D97-AF65-F5344CB8AC3E}">
+        <p14:creationId xmlns:p14="http://schemas.microsoft.com/office/powerpoint/2010/main" val="1669418864"/>
+      </p:ext>
+    </p:extLst>
+  </p:cSld>
+  <p:clrMapOvr>
+    <a:masterClrMapping/>
+  </p:clrMapOvr>
+  <mc:AlternateContent xmlns:mc="http://schemas.openxmlformats.org/markup-compatibility/2006" xmlns:p14="http://schemas.microsoft.com/office/powerpoint/2010/main">
+    <mc:Choice Requires="p14">
+      <p:transition spd="med" p14:dur="700">
+        <p:fade/>
+      </p:transition>
+    </mc:Choice>
+    <mc:Fallback xmlns="">
+      <p:transition spd="med">
+        <p:fade/>
+      </p:transition>
+    </mc:Fallback>
+  </mc:AlternateContent>
+</p:sld>
+</file>
+
+<file path=ppt/slides/slide19.xml><?xml version="1.0" encoding="utf-8"?>
+<p:sld xmlns:a="http://schemas.openxmlformats.org/drawingml/2006/main" xmlns:r="http://schemas.openxmlformats.org/officeDocument/2006/relationships" xmlns:p="http://schemas.openxmlformats.org/presentationml/2006/main">
+  <p:cSld>
+    <p:spTree>
+      <p:nvGrpSpPr>
+        <p:cNvPr id="1" name=""/>
+        <p:cNvGrpSpPr/>
+        <p:nvPr/>
+      </p:nvGrpSpPr>
+      <p:grpSpPr>
+        <a:xfrm>
+          <a:off x="0" y="0"/>
+          <a:ext cx="0" cy="0"/>
+          <a:chOff x="0" y="0"/>
+          <a:chExt cx="0" cy="0"/>
+        </a:xfrm>
+      </p:grpSpPr>
+      <p:sp>
+        <p:nvSpPr>
+          <p:cNvPr id="8" name="Title 7"/>
+          <p:cNvSpPr>
+            <a:spLocks noGrp="1"/>
+          </p:cNvSpPr>
+          <p:nvPr>
+            <p:ph type="title"/>
+          </p:nvPr>
+        </p:nvSpPr>
+        <p:spPr/>
+        <p:txBody>
+          <a:bodyPr/>
+          <a:lstStyle/>
+          <a:p>
+            <a:r>
+              <a:rPr lang="en-US" dirty="0"/>
+              <a:t>Thank you letting us share our story!</a:t>
+            </a:r>
+          </a:p>
+        </p:txBody>
+      </p:sp>
+      <p:pic>
+        <p:nvPicPr>
+          <p:cNvPr id="3" name="Picture Placeholder 2">
+            <a:extLst>
+              <a:ext uri="{FF2B5EF4-FFF2-40B4-BE49-F238E27FC236}">
+                <a16:creationId xmlns:a16="http://schemas.microsoft.com/office/drawing/2014/main" id="{1DE29613-B19C-4541-92B5-5CA589E9AE0E}"/>
+              </a:ext>
+            </a:extLst>
+          </p:cNvPr>
+          <p:cNvPicPr>
+            <a:picLocks noGrp="1" noChangeAspect="1"/>
+          </p:cNvPicPr>
+          <p:nvPr>
             <p:ph type="pic" idx="1"/>
           </p:nvPr>
-        </p:nvSpPr>
-        <p:spPr/>
-      </p:sp>
+        </p:nvPicPr>
+        <p:blipFill>
+          <a:blip r:embed="rId2"/>
+          <a:srcRect t="533" b="533"/>
+          <a:stretch>
+            <a:fillRect/>
+          </a:stretch>
+        </p:blipFill>
+        <p:spPr>
+          <a:xfrm>
+            <a:off x="1323974" y="1164059"/>
+            <a:ext cx="7378527" cy="3300783"/>
+          </a:xfrm>
+        </p:spPr>
+      </p:pic>
       <p:sp>
         <p:nvSpPr>
           <p:cNvPr id="10" name="Text Placeholder 9"/>
@@ -10918,81 +11899,12 @@
           <a:chExt cx="0" cy="0"/>
         </a:xfrm>
       </p:grpSpPr>
-      <p:sp>
-        <p:nvSpPr>
-          <p:cNvPr id="2" name="Title 1"/>
-          <p:cNvSpPr>
-            <a:spLocks noGrp="1"/>
-          </p:cNvSpPr>
-          <p:nvPr>
-            <p:ph type="title"/>
-          </p:nvPr>
-        </p:nvSpPr>
-        <p:spPr>
-          <a:xfrm>
-            <a:off x="677334" y="609600"/>
-            <a:ext cx="8596668" cy="952500"/>
-          </a:xfrm>
-        </p:spPr>
-        <p:txBody>
-          <a:bodyPr/>
-          <a:lstStyle/>
-          <a:p>
-            <a:r>
-              <a:rPr lang="en-US" dirty="0"/>
-              <a:t>EV’s Florida Story</a:t>
-            </a:r>
-          </a:p>
-        </p:txBody>
-      </p:sp>
-      <p:sp>
-        <p:nvSpPr>
-          <p:cNvPr id="3" name="Content Placeholder 2"/>
-          <p:cNvSpPr>
-            <a:spLocks noGrp="1"/>
-          </p:cNvSpPr>
-          <p:nvPr>
-            <p:ph idx="1"/>
-          </p:nvPr>
-        </p:nvSpPr>
-        <p:spPr>
-          <a:xfrm>
-            <a:off x="553509" y="1562100"/>
-            <a:ext cx="8596668" cy="3880773"/>
-          </a:xfrm>
-        </p:spPr>
-        <p:txBody>
-          <a:bodyPr/>
-          <a:lstStyle/>
-          <a:p>
-            <a:r>
-              <a:rPr lang="en-US" dirty="0"/>
-              <a:t>Investigation in EV’s in Florida</a:t>
-            </a:r>
-          </a:p>
-          <a:p>
-            <a:r>
-              <a:rPr lang="en-US" dirty="0"/>
-              <a:t>Data Analysis and Data Cleaning</a:t>
-            </a:r>
-          </a:p>
-          <a:p>
-            <a:r>
-              <a:rPr lang="en-US" dirty="0"/>
-              <a:t>Environmental Impact</a:t>
-            </a:r>
-          </a:p>
-          <a:p>
-            <a:endParaRPr lang="en-US" dirty="0"/>
-          </a:p>
-        </p:txBody>
-      </p:sp>
       <p:pic>
         <p:nvPicPr>
-          <p:cNvPr id="5" name="Picture 4">
+          <p:cNvPr id="6" name="Picture 5">
             <a:extLst>
               <a:ext uri="{FF2B5EF4-FFF2-40B4-BE49-F238E27FC236}">
-                <a16:creationId xmlns:a16="http://schemas.microsoft.com/office/drawing/2014/main" id="{2F752EB7-D9F4-41EF-997E-0B412D7E3B8D}"/>
+                <a16:creationId xmlns:a16="http://schemas.microsoft.com/office/drawing/2014/main" id="{28BDA05A-9AC1-46EF-ADA3-B75951036893}"/>
               </a:ext>
             </a:extLst>
           </p:cNvPr>
@@ -11009,14 +11921,121 @@
         </p:blipFill>
         <p:spPr>
           <a:xfrm>
-            <a:off x="429684" y="4333875"/>
-            <a:ext cx="3657600" cy="2438400"/>
+            <a:off x="0" y="0"/>
+            <a:ext cx="11201401" cy="6858000"/>
           </a:xfrm>
           <a:prstGeom prst="rect">
             <a:avLst/>
           </a:prstGeom>
         </p:spPr>
       </p:pic>
+      <p:sp>
+        <p:nvSpPr>
+          <p:cNvPr id="2" name="Title 1"/>
+          <p:cNvSpPr>
+            <a:spLocks noGrp="1"/>
+          </p:cNvSpPr>
+          <p:nvPr>
+            <p:ph type="title"/>
+          </p:nvPr>
+        </p:nvSpPr>
+        <p:spPr>
+          <a:xfrm>
+            <a:off x="2200275" y="190500"/>
+            <a:ext cx="8058150" cy="952500"/>
+          </a:xfrm>
+        </p:spPr>
+        <p:txBody>
+          <a:bodyPr>
+            <a:normAutofit/>
+          </a:bodyPr>
+          <a:lstStyle/>
+          <a:p>
+            <a:r>
+              <a:rPr lang="en-US" sz="4800" b="1" dirty="0">
+                <a:solidFill>
+                  <a:schemeClr val="tx1"/>
+                </a:solidFill>
+              </a:rPr>
+              <a:t>EV Cars Florida Story</a:t>
+            </a:r>
+          </a:p>
+        </p:txBody>
+      </p:sp>
+      <p:sp>
+        <p:nvSpPr>
+          <p:cNvPr id="3" name="Content Placeholder 2"/>
+          <p:cNvSpPr>
+            <a:spLocks noGrp="1"/>
+          </p:cNvSpPr>
+          <p:nvPr>
+            <p:ph idx="1"/>
+          </p:nvPr>
+        </p:nvSpPr>
+        <p:spPr>
+          <a:xfrm>
+            <a:off x="134408" y="1438275"/>
+            <a:ext cx="5037667" cy="2295525"/>
+          </a:xfrm>
+        </p:spPr>
+        <p:txBody>
+          <a:bodyPr/>
+          <a:lstStyle/>
+          <a:p>
+            <a:r>
+              <a:rPr lang="en-US" sz="2200" b="1" dirty="0">
+                <a:solidFill>
+                  <a:schemeClr val="tx1"/>
+                </a:solidFill>
+              </a:rPr>
+              <a:t>Investigation in EV Cars in Florida</a:t>
+            </a:r>
+          </a:p>
+          <a:p>
+            <a:r>
+              <a:rPr lang="en-US" sz="2200" b="1" dirty="0">
+                <a:solidFill>
+                  <a:schemeClr val="tx1"/>
+                </a:solidFill>
+              </a:rPr>
+              <a:t>Data Analysis and Data Cleaning</a:t>
+            </a:r>
+          </a:p>
+          <a:p>
+            <a:r>
+              <a:rPr lang="en-US" sz="2200" b="1" dirty="0">
+                <a:solidFill>
+                  <a:schemeClr val="tx1"/>
+                </a:solidFill>
+              </a:rPr>
+              <a:t>Environmental Impact</a:t>
+            </a:r>
+          </a:p>
+          <a:p>
+            <a:r>
+              <a:rPr lang="en-US" sz="2200" b="1" dirty="0">
+                <a:solidFill>
+                  <a:schemeClr val="tx1"/>
+                </a:solidFill>
+              </a:rPr>
+              <a:t>EV Stations in Florida</a:t>
+            </a:r>
+          </a:p>
+          <a:p>
+            <a:r>
+              <a:rPr lang="en-US" sz="2200" b="1" dirty="0">
+                <a:solidFill>
+                  <a:schemeClr val="tx1"/>
+                </a:solidFill>
+              </a:rPr>
+              <a:t>Website</a:t>
+            </a:r>
+          </a:p>
+          <a:p>
+            <a:endParaRPr lang="en-US" dirty="0"/>
+          </a:p>
+        </p:txBody>
+      </p:sp>
     </p:spTree>
     <p:extLst>
       <p:ext uri="{BB962C8B-B14F-4D97-AF65-F5344CB8AC3E}">
@@ -11059,6 +12078,408 @@
           <a:chExt cx="0" cy="0"/>
         </a:xfrm>
       </p:grpSpPr>
+      <p:pic>
+        <p:nvPicPr>
+          <p:cNvPr id="11" name="Picture 10">
+            <a:extLst>
+              <a:ext uri="{FF2B5EF4-FFF2-40B4-BE49-F238E27FC236}">
+                <a16:creationId xmlns:a16="http://schemas.microsoft.com/office/drawing/2014/main" id="{F01DBF69-12DD-439E-A3EF-C4BCB6DE3397}"/>
+              </a:ext>
+            </a:extLst>
+          </p:cNvPr>
+          <p:cNvPicPr>
+            <a:picLocks noChangeAspect="1"/>
+          </p:cNvPicPr>
+          <p:nvPr/>
+        </p:nvPicPr>
+        <p:blipFill>
+          <a:blip r:embed="rId2"/>
+          <a:stretch>
+            <a:fillRect/>
+          </a:stretch>
+        </p:blipFill>
+        <p:spPr>
+          <a:xfrm>
+            <a:off x="0" y="0"/>
+            <a:ext cx="12192000" cy="6991350"/>
+          </a:xfrm>
+          <a:prstGeom prst="rect">
+            <a:avLst/>
+          </a:prstGeom>
+        </p:spPr>
+      </p:pic>
+      <p:sp>
+        <p:nvSpPr>
+          <p:cNvPr id="4" name="Title 3"/>
+          <p:cNvSpPr>
+            <a:spLocks noGrp="1"/>
+          </p:cNvSpPr>
+          <p:nvPr>
+            <p:ph type="title"/>
+          </p:nvPr>
+        </p:nvSpPr>
+        <p:spPr>
+          <a:xfrm>
+            <a:off x="219077" y="4276725"/>
+            <a:ext cx="7458073" cy="1657349"/>
+          </a:xfrm>
+          <a:solidFill>
+            <a:srgbClr val="92D050"/>
+          </a:solidFill>
+        </p:spPr>
+        <p:txBody>
+          <a:bodyPr anchor="ctr"/>
+          <a:lstStyle/>
+          <a:p>
+            <a:pPr algn="ctr"/>
+            <a:r>
+              <a:rPr lang="en-US" b="1" dirty="0">
+                <a:solidFill>
+                  <a:schemeClr val="bg1"/>
+                </a:solidFill>
+              </a:rPr>
+              <a:t>Investigation in EV Cars</a:t>
+            </a:r>
+            <a:br>
+              <a:rPr lang="en-US" b="1" dirty="0">
+                <a:solidFill>
+                  <a:schemeClr val="bg1"/>
+                </a:solidFill>
+              </a:rPr>
+            </a:br>
+            <a:r>
+              <a:rPr lang="en-US" b="1" dirty="0">
+                <a:solidFill>
+                  <a:schemeClr val="bg1"/>
+                </a:solidFill>
+              </a:rPr>
+              <a:t>in Florida</a:t>
+            </a:r>
+          </a:p>
+        </p:txBody>
+      </p:sp>
+    </p:spTree>
+    <p:extLst>
+      <p:ext uri="{BB962C8B-B14F-4D97-AF65-F5344CB8AC3E}">
+        <p14:creationId xmlns:p14="http://schemas.microsoft.com/office/powerpoint/2010/main" val="2312531367"/>
+      </p:ext>
+    </p:extLst>
+  </p:cSld>
+  <p:clrMapOvr>
+    <a:masterClrMapping/>
+  </p:clrMapOvr>
+  <mc:AlternateContent xmlns:mc="http://schemas.openxmlformats.org/markup-compatibility/2006">
+    <mc:Choice xmlns:p14="http://schemas.microsoft.com/office/powerpoint/2010/main" Requires="p14">
+      <p:transition spd="med" p14:dur="700">
+        <p:fade/>
+      </p:transition>
+    </mc:Choice>
+    <mc:Fallback>
+      <p:transition spd="med">
+        <p:fade/>
+      </p:transition>
+    </mc:Fallback>
+  </mc:AlternateContent>
+</p:sld>
+</file>
+
+<file path=ppt/slides/slide4.xml><?xml version="1.0" encoding="utf-8"?>
+<p:sld xmlns:a="http://schemas.openxmlformats.org/drawingml/2006/main" xmlns:r="http://schemas.openxmlformats.org/officeDocument/2006/relationships" xmlns:p="http://schemas.openxmlformats.org/presentationml/2006/main">
+  <p:cSld>
+    <p:spTree>
+      <p:nvGrpSpPr>
+        <p:cNvPr id="1" name=""/>
+        <p:cNvGrpSpPr/>
+        <p:nvPr/>
+      </p:nvGrpSpPr>
+      <p:grpSpPr>
+        <a:xfrm>
+          <a:off x="0" y="0"/>
+          <a:ext cx="0" cy="0"/>
+          <a:chOff x="0" y="0"/>
+          <a:chExt cx="0" cy="0"/>
+        </a:xfrm>
+      </p:grpSpPr>
+      <p:sp>
+        <p:nvSpPr>
+          <p:cNvPr id="12" name="Title 11"/>
+          <p:cNvSpPr>
+            <a:spLocks noGrp="1"/>
+          </p:cNvSpPr>
+          <p:nvPr>
+            <p:ph type="title"/>
+          </p:nvPr>
+        </p:nvSpPr>
+        <p:spPr/>
+        <p:txBody>
+          <a:bodyPr/>
+          <a:lstStyle/>
+          <a:p>
+            <a:r>
+              <a:rPr lang="en-US" dirty="0"/>
+              <a:t>Add a Slide Title - 2</a:t>
+            </a:r>
+          </a:p>
+        </p:txBody>
+      </p:sp>
+      <p:sp>
+        <p:nvSpPr>
+          <p:cNvPr id="13" name="Text Placeholder 12"/>
+          <p:cNvSpPr>
+            <a:spLocks noGrp="1"/>
+          </p:cNvSpPr>
+          <p:nvPr>
+            <p:ph type="body" idx="1"/>
+          </p:nvPr>
+        </p:nvSpPr>
+        <p:spPr/>
+        <p:txBody>
+          <a:bodyPr/>
+          <a:lstStyle/>
+          <a:p>
+            <a:endParaRPr lang="en-US" dirty="0"/>
+          </a:p>
+        </p:txBody>
+      </p:sp>
+      <p:sp>
+        <p:nvSpPr>
+          <p:cNvPr id="14" name="Content Placeholder 13"/>
+          <p:cNvSpPr>
+            <a:spLocks noGrp="1"/>
+          </p:cNvSpPr>
+          <p:nvPr>
+            <p:ph sz="half" idx="2"/>
+          </p:nvPr>
+        </p:nvSpPr>
+        <p:spPr/>
+        <p:txBody>
+          <a:bodyPr/>
+          <a:lstStyle/>
+          <a:p>
+            <a:endParaRPr lang="en-US" dirty="0"/>
+          </a:p>
+        </p:txBody>
+      </p:sp>
+      <p:sp>
+        <p:nvSpPr>
+          <p:cNvPr id="15" name="Text Placeholder 14"/>
+          <p:cNvSpPr>
+            <a:spLocks noGrp="1"/>
+          </p:cNvSpPr>
+          <p:nvPr>
+            <p:ph type="body" sz="quarter" idx="3"/>
+          </p:nvPr>
+        </p:nvSpPr>
+        <p:spPr/>
+        <p:txBody>
+          <a:bodyPr/>
+          <a:lstStyle/>
+          <a:p>
+            <a:endParaRPr lang="en-US" dirty="0"/>
+          </a:p>
+        </p:txBody>
+      </p:sp>
+      <p:sp>
+        <p:nvSpPr>
+          <p:cNvPr id="16" name="Content Placeholder 15"/>
+          <p:cNvSpPr>
+            <a:spLocks noGrp="1"/>
+          </p:cNvSpPr>
+          <p:nvPr>
+            <p:ph sz="quarter" idx="4"/>
+          </p:nvPr>
+        </p:nvSpPr>
+        <p:spPr/>
+        <p:txBody>
+          <a:bodyPr/>
+          <a:lstStyle/>
+          <a:p>
+            <a:endParaRPr lang="en-US" dirty="0"/>
+          </a:p>
+        </p:txBody>
+      </p:sp>
+    </p:spTree>
+    <p:extLst>
+      <p:ext uri="{BB962C8B-B14F-4D97-AF65-F5344CB8AC3E}">
+        <p14:creationId xmlns:p14="http://schemas.microsoft.com/office/powerpoint/2010/main" val="805503380"/>
+      </p:ext>
+    </p:extLst>
+  </p:cSld>
+  <p:clrMapOvr>
+    <a:masterClrMapping/>
+  </p:clrMapOvr>
+  <mc:AlternateContent xmlns:mc="http://schemas.openxmlformats.org/markup-compatibility/2006" xmlns:p14="http://schemas.microsoft.com/office/powerpoint/2010/main">
+    <mc:Choice Requires="p14">
+      <p:transition spd="med" p14:dur="700">
+        <p:fade/>
+      </p:transition>
+    </mc:Choice>
+    <mc:Fallback xmlns="">
+      <p:transition spd="med">
+        <p:fade/>
+      </p:transition>
+    </mc:Fallback>
+  </mc:AlternateContent>
+</p:sld>
+</file>
+
+<file path=ppt/slides/slide5.xml><?xml version="1.0" encoding="utf-8"?>
+<p:sld xmlns:a="http://schemas.openxmlformats.org/drawingml/2006/main" xmlns:r="http://schemas.openxmlformats.org/officeDocument/2006/relationships" xmlns:p="http://schemas.openxmlformats.org/presentationml/2006/main">
+  <p:cSld>
+    <p:spTree>
+      <p:nvGrpSpPr>
+        <p:cNvPr id="1" name=""/>
+        <p:cNvGrpSpPr/>
+        <p:nvPr/>
+      </p:nvGrpSpPr>
+      <p:grpSpPr>
+        <a:xfrm>
+          <a:off x="0" y="0"/>
+          <a:ext cx="0" cy="0"/>
+          <a:chOff x="0" y="0"/>
+          <a:chExt cx="0" cy="0"/>
+        </a:xfrm>
+      </p:grpSpPr>
+      <p:sp>
+        <p:nvSpPr>
+          <p:cNvPr id="12" name="Title 11"/>
+          <p:cNvSpPr>
+            <a:spLocks noGrp="1"/>
+          </p:cNvSpPr>
+          <p:nvPr>
+            <p:ph type="title"/>
+          </p:nvPr>
+        </p:nvSpPr>
+        <p:spPr/>
+        <p:txBody>
+          <a:bodyPr/>
+          <a:lstStyle/>
+          <a:p>
+            <a:r>
+              <a:rPr lang="en-US" dirty="0"/>
+              <a:t>Add a Slide Title - 3</a:t>
+            </a:r>
+          </a:p>
+        </p:txBody>
+      </p:sp>
+      <p:sp>
+        <p:nvSpPr>
+          <p:cNvPr id="13" name="Text Placeholder 12"/>
+          <p:cNvSpPr>
+            <a:spLocks noGrp="1"/>
+          </p:cNvSpPr>
+          <p:nvPr>
+            <p:ph type="body" idx="1"/>
+          </p:nvPr>
+        </p:nvSpPr>
+        <p:spPr/>
+        <p:txBody>
+          <a:bodyPr/>
+          <a:lstStyle/>
+          <a:p>
+            <a:endParaRPr lang="en-US" dirty="0"/>
+          </a:p>
+        </p:txBody>
+      </p:sp>
+      <p:sp>
+        <p:nvSpPr>
+          <p:cNvPr id="14" name="Content Placeholder 13"/>
+          <p:cNvSpPr>
+            <a:spLocks noGrp="1"/>
+          </p:cNvSpPr>
+          <p:nvPr>
+            <p:ph sz="half" idx="2"/>
+          </p:nvPr>
+        </p:nvSpPr>
+        <p:spPr/>
+        <p:txBody>
+          <a:bodyPr/>
+          <a:lstStyle/>
+          <a:p>
+            <a:endParaRPr lang="en-US" dirty="0"/>
+          </a:p>
+        </p:txBody>
+      </p:sp>
+      <p:sp>
+        <p:nvSpPr>
+          <p:cNvPr id="15" name="Text Placeholder 14"/>
+          <p:cNvSpPr>
+            <a:spLocks noGrp="1"/>
+          </p:cNvSpPr>
+          <p:nvPr>
+            <p:ph type="body" sz="quarter" idx="3"/>
+          </p:nvPr>
+        </p:nvSpPr>
+        <p:spPr/>
+        <p:txBody>
+          <a:bodyPr/>
+          <a:lstStyle/>
+          <a:p>
+            <a:endParaRPr lang="en-US" dirty="0"/>
+          </a:p>
+        </p:txBody>
+      </p:sp>
+      <p:sp>
+        <p:nvSpPr>
+          <p:cNvPr id="16" name="Content Placeholder 15"/>
+          <p:cNvSpPr>
+            <a:spLocks noGrp="1"/>
+          </p:cNvSpPr>
+          <p:nvPr>
+            <p:ph sz="quarter" idx="4"/>
+          </p:nvPr>
+        </p:nvSpPr>
+        <p:spPr/>
+        <p:txBody>
+          <a:bodyPr/>
+          <a:lstStyle/>
+          <a:p>
+            <a:endParaRPr lang="en-US" dirty="0"/>
+          </a:p>
+        </p:txBody>
+      </p:sp>
+    </p:spTree>
+    <p:extLst>
+      <p:ext uri="{BB962C8B-B14F-4D97-AF65-F5344CB8AC3E}">
+        <p14:creationId xmlns:p14="http://schemas.microsoft.com/office/powerpoint/2010/main" val="3166979570"/>
+      </p:ext>
+    </p:extLst>
+  </p:cSld>
+  <p:clrMapOvr>
+    <a:masterClrMapping/>
+  </p:clrMapOvr>
+  <mc:AlternateContent xmlns:mc="http://schemas.openxmlformats.org/markup-compatibility/2006" xmlns:p14="http://schemas.microsoft.com/office/powerpoint/2010/main">
+    <mc:Choice Requires="p14">
+      <p:transition spd="med" p14:dur="700">
+        <p:fade/>
+      </p:transition>
+    </mc:Choice>
+    <mc:Fallback xmlns="">
+      <p:transition spd="med">
+        <p:fade/>
+      </p:transition>
+    </mc:Fallback>
+  </mc:AlternateContent>
+</p:sld>
+</file>
+
+<file path=ppt/slides/slide6.xml><?xml version="1.0" encoding="utf-8"?>
+<p:sld xmlns:a="http://schemas.openxmlformats.org/drawingml/2006/main" xmlns:r="http://schemas.openxmlformats.org/officeDocument/2006/relationships" xmlns:p="http://schemas.openxmlformats.org/presentationml/2006/main">
+  <p:cSld>
+    <p:spTree>
+      <p:nvGrpSpPr>
+        <p:cNvPr id="1" name=""/>
+        <p:cNvGrpSpPr/>
+        <p:nvPr/>
+      </p:nvGrpSpPr>
+      <p:grpSpPr>
+        <a:xfrm>
+          <a:off x="0" y="0"/>
+          <a:ext cx="0" cy="0"/>
+          <a:chOff x="0" y="0"/>
+          <a:chExt cx="0" cy="0"/>
+        </a:xfrm>
+      </p:grpSpPr>
       <p:sp>
         <p:nvSpPr>
           <p:cNvPr id="2" name="Title 1"/>
@@ -11133,7 +12554,362 @@
 </p:sld>
 </file>
 
-<file path=ppt/slides/slide4.xml><?xml version="1.0" encoding="utf-8"?>
+<file path=ppt/slides/slide7.xml><?xml version="1.0" encoding="utf-8"?>
+<p:sld xmlns:a="http://schemas.openxmlformats.org/drawingml/2006/main" xmlns:r="http://schemas.openxmlformats.org/officeDocument/2006/relationships" xmlns:p="http://schemas.openxmlformats.org/presentationml/2006/main">
+  <p:cSld>
+    <p:spTree>
+      <p:nvGrpSpPr>
+        <p:cNvPr id="1" name=""/>
+        <p:cNvGrpSpPr/>
+        <p:nvPr/>
+      </p:nvGrpSpPr>
+      <p:grpSpPr>
+        <a:xfrm>
+          <a:off x="0" y="0"/>
+          <a:ext cx="0" cy="0"/>
+          <a:chOff x="0" y="0"/>
+          <a:chExt cx="0" cy="0"/>
+        </a:xfrm>
+      </p:grpSpPr>
+      <p:pic>
+        <p:nvPicPr>
+          <p:cNvPr id="4" name="Picture 3">
+            <a:extLst>
+              <a:ext uri="{FF2B5EF4-FFF2-40B4-BE49-F238E27FC236}">
+                <a16:creationId xmlns:a16="http://schemas.microsoft.com/office/drawing/2014/main" id="{E2FF6D8B-B80B-4661-B63F-2B874835274F}"/>
+              </a:ext>
+            </a:extLst>
+          </p:cNvPr>
+          <p:cNvPicPr>
+            <a:picLocks noChangeAspect="1"/>
+          </p:cNvPicPr>
+          <p:nvPr/>
+        </p:nvPicPr>
+        <p:blipFill>
+          <a:blip r:embed="rId2"/>
+          <a:stretch>
+            <a:fillRect/>
+          </a:stretch>
+        </p:blipFill>
+        <p:spPr>
+          <a:xfrm>
+            <a:off x="0" y="-1"/>
+            <a:ext cx="12192000" cy="6858001"/>
+          </a:xfrm>
+          <a:prstGeom prst="rect">
+            <a:avLst/>
+          </a:prstGeom>
+        </p:spPr>
+      </p:pic>
+      <p:sp>
+        <p:nvSpPr>
+          <p:cNvPr id="2" name="Title 1">
+            <a:extLst>
+              <a:ext uri="{FF2B5EF4-FFF2-40B4-BE49-F238E27FC236}">
+                <a16:creationId xmlns:a16="http://schemas.microsoft.com/office/drawing/2014/main" id="{3EE96425-70B7-4191-84C2-49BE22C05710}"/>
+              </a:ext>
+            </a:extLst>
+          </p:cNvPr>
+          <p:cNvSpPr txBox="1">
+            <a:spLocks/>
+          </p:cNvSpPr>
+          <p:nvPr/>
+        </p:nvSpPr>
+        <p:spPr>
+          <a:xfrm>
+            <a:off x="6000750" y="514350"/>
+            <a:ext cx="4248150" cy="2562225"/>
+          </a:xfrm>
+          <a:prstGeom prst="rect">
+            <a:avLst/>
+          </a:prstGeom>
+        </p:spPr>
+        <p:txBody>
+          <a:bodyPr>
+            <a:normAutofit/>
+          </a:bodyPr>
+          <a:lstStyle>
+            <a:lvl1pPr algn="l" defTabSz="457200" rtl="0" eaLnBrk="1" latinLnBrk="0" hangingPunct="1">
+              <a:spcBef>
+                <a:spcPct val="0"/>
+              </a:spcBef>
+              <a:buNone/>
+              <a:defRPr sz="3600" kern="1200">
+                <a:solidFill>
+                  <a:schemeClr val="accent1"/>
+                </a:solidFill>
+                <a:latin typeface="+mj-lt"/>
+                <a:ea typeface="+mj-ea"/>
+                <a:cs typeface="+mj-cs"/>
+              </a:defRPr>
+            </a:lvl1pPr>
+            <a:lvl2pPr eaLnBrk="1" hangingPunct="1">
+              <a:defRPr>
+                <a:solidFill>
+                  <a:schemeClr val="tx2"/>
+                </a:solidFill>
+              </a:defRPr>
+            </a:lvl2pPr>
+            <a:lvl3pPr eaLnBrk="1" hangingPunct="1">
+              <a:defRPr>
+                <a:solidFill>
+                  <a:schemeClr val="tx2"/>
+                </a:solidFill>
+              </a:defRPr>
+            </a:lvl3pPr>
+            <a:lvl4pPr eaLnBrk="1" hangingPunct="1">
+              <a:defRPr>
+                <a:solidFill>
+                  <a:schemeClr val="tx2"/>
+                </a:solidFill>
+              </a:defRPr>
+            </a:lvl4pPr>
+            <a:lvl5pPr eaLnBrk="1" hangingPunct="1">
+              <a:defRPr>
+                <a:solidFill>
+                  <a:schemeClr val="tx2"/>
+                </a:solidFill>
+              </a:defRPr>
+            </a:lvl5pPr>
+            <a:lvl6pPr eaLnBrk="1" hangingPunct="1">
+              <a:defRPr>
+                <a:solidFill>
+                  <a:schemeClr val="tx2"/>
+                </a:solidFill>
+              </a:defRPr>
+            </a:lvl6pPr>
+            <a:lvl7pPr eaLnBrk="1" hangingPunct="1">
+              <a:defRPr>
+                <a:solidFill>
+                  <a:schemeClr val="tx2"/>
+                </a:solidFill>
+              </a:defRPr>
+            </a:lvl7pPr>
+            <a:lvl8pPr eaLnBrk="1" hangingPunct="1">
+              <a:defRPr>
+                <a:solidFill>
+                  <a:schemeClr val="tx2"/>
+                </a:solidFill>
+              </a:defRPr>
+            </a:lvl8pPr>
+            <a:lvl9pPr eaLnBrk="1" hangingPunct="1">
+              <a:defRPr>
+                <a:solidFill>
+                  <a:schemeClr val="tx2"/>
+                </a:solidFill>
+              </a:defRPr>
+            </a:lvl9pPr>
+          </a:lstStyle>
+          <a:p>
+            <a:pPr algn="ctr"/>
+            <a:r>
+              <a:rPr lang="en-US" sz="4800" b="1" dirty="0">
+                <a:solidFill>
+                  <a:schemeClr val="accent2">
+                    <a:lumMod val="60000"/>
+                    <a:lumOff val="40000"/>
+                  </a:schemeClr>
+                </a:solidFill>
+              </a:rPr>
+              <a:t>Data Analysis </a:t>
+            </a:r>
+          </a:p>
+          <a:p>
+            <a:pPr algn="ctr"/>
+            <a:r>
+              <a:rPr lang="en-US" sz="4800" b="1" dirty="0">
+                <a:solidFill>
+                  <a:schemeClr val="accent2">
+                    <a:lumMod val="60000"/>
+                    <a:lumOff val="40000"/>
+                  </a:schemeClr>
+                </a:solidFill>
+              </a:rPr>
+              <a:t>&amp; </a:t>
+            </a:r>
+          </a:p>
+          <a:p>
+            <a:pPr algn="ctr"/>
+            <a:r>
+              <a:rPr lang="en-US" sz="4800" b="1" dirty="0">
+                <a:solidFill>
+                  <a:schemeClr val="accent2">
+                    <a:lumMod val="60000"/>
+                    <a:lumOff val="40000"/>
+                  </a:schemeClr>
+                </a:solidFill>
+              </a:rPr>
+              <a:t>Data Cleaning</a:t>
+            </a:r>
+          </a:p>
+        </p:txBody>
+      </p:sp>
+    </p:spTree>
+    <p:extLst>
+      <p:ext uri="{BB962C8B-B14F-4D97-AF65-F5344CB8AC3E}">
+        <p14:creationId xmlns:p14="http://schemas.microsoft.com/office/powerpoint/2010/main" val="397299718"/>
+      </p:ext>
+    </p:extLst>
+  </p:cSld>
+  <p:clrMapOvr>
+    <a:masterClrMapping/>
+  </p:clrMapOvr>
+  <mc:AlternateContent xmlns:mc="http://schemas.openxmlformats.org/markup-compatibility/2006" xmlns:p14="http://schemas.microsoft.com/office/powerpoint/2010/main">
+    <mc:Choice Requires="p14">
+      <p:transition spd="med" p14:dur="700">
+        <p:fade/>
+      </p:transition>
+    </mc:Choice>
+    <mc:Fallback xmlns="">
+      <p:transition spd="med">
+        <p:fade/>
+      </p:transition>
+    </mc:Fallback>
+  </mc:AlternateContent>
+</p:sld>
+</file>
+
+<file path=ppt/slides/slide8.xml><?xml version="1.0" encoding="utf-8"?>
+<p:sld xmlns:a="http://schemas.openxmlformats.org/drawingml/2006/main" xmlns:r="http://schemas.openxmlformats.org/officeDocument/2006/relationships" xmlns:p="http://schemas.openxmlformats.org/presentationml/2006/main">
+  <p:cSld>
+    <p:spTree>
+      <p:nvGrpSpPr>
+        <p:cNvPr id="1" name=""/>
+        <p:cNvGrpSpPr/>
+        <p:nvPr/>
+      </p:nvGrpSpPr>
+      <p:grpSpPr>
+        <a:xfrm>
+          <a:off x="0" y="0"/>
+          <a:ext cx="0" cy="0"/>
+          <a:chOff x="0" y="0"/>
+          <a:chExt cx="0" cy="0"/>
+        </a:xfrm>
+      </p:grpSpPr>
+      <p:sp>
+        <p:nvSpPr>
+          <p:cNvPr id="12" name="Title 11"/>
+          <p:cNvSpPr>
+            <a:spLocks noGrp="1"/>
+          </p:cNvSpPr>
+          <p:nvPr>
+            <p:ph type="title"/>
+          </p:nvPr>
+        </p:nvSpPr>
+        <p:spPr/>
+        <p:txBody>
+          <a:bodyPr/>
+          <a:lstStyle/>
+          <a:p>
+            <a:r>
+              <a:rPr lang="en-US" dirty="0"/>
+              <a:t>Add a Slide Title - 2</a:t>
+            </a:r>
+          </a:p>
+        </p:txBody>
+      </p:sp>
+      <p:sp>
+        <p:nvSpPr>
+          <p:cNvPr id="13" name="Text Placeholder 12"/>
+          <p:cNvSpPr>
+            <a:spLocks noGrp="1"/>
+          </p:cNvSpPr>
+          <p:nvPr>
+            <p:ph type="body" idx="1"/>
+          </p:nvPr>
+        </p:nvSpPr>
+        <p:spPr/>
+        <p:txBody>
+          <a:bodyPr/>
+          <a:lstStyle/>
+          <a:p>
+            <a:endParaRPr lang="en-US" dirty="0"/>
+          </a:p>
+        </p:txBody>
+      </p:sp>
+      <p:sp>
+        <p:nvSpPr>
+          <p:cNvPr id="14" name="Content Placeholder 13"/>
+          <p:cNvSpPr>
+            <a:spLocks noGrp="1"/>
+          </p:cNvSpPr>
+          <p:nvPr>
+            <p:ph sz="half" idx="2"/>
+          </p:nvPr>
+        </p:nvSpPr>
+        <p:spPr/>
+        <p:txBody>
+          <a:bodyPr/>
+          <a:lstStyle/>
+          <a:p>
+            <a:endParaRPr lang="en-US" dirty="0"/>
+          </a:p>
+        </p:txBody>
+      </p:sp>
+      <p:sp>
+        <p:nvSpPr>
+          <p:cNvPr id="15" name="Text Placeholder 14"/>
+          <p:cNvSpPr>
+            <a:spLocks noGrp="1"/>
+          </p:cNvSpPr>
+          <p:nvPr>
+            <p:ph type="body" sz="quarter" idx="3"/>
+          </p:nvPr>
+        </p:nvSpPr>
+        <p:spPr/>
+        <p:txBody>
+          <a:bodyPr/>
+          <a:lstStyle/>
+          <a:p>
+            <a:endParaRPr lang="en-US" dirty="0"/>
+          </a:p>
+        </p:txBody>
+      </p:sp>
+      <p:sp>
+        <p:nvSpPr>
+          <p:cNvPr id="16" name="Content Placeholder 15"/>
+          <p:cNvSpPr>
+            <a:spLocks noGrp="1"/>
+          </p:cNvSpPr>
+          <p:nvPr>
+            <p:ph sz="quarter" idx="4"/>
+          </p:nvPr>
+        </p:nvSpPr>
+        <p:spPr/>
+        <p:txBody>
+          <a:bodyPr/>
+          <a:lstStyle/>
+          <a:p>
+            <a:endParaRPr lang="en-US" dirty="0"/>
+          </a:p>
+        </p:txBody>
+      </p:sp>
+    </p:spTree>
+    <p:extLst>
+      <p:ext uri="{BB962C8B-B14F-4D97-AF65-F5344CB8AC3E}">
+        <p14:creationId xmlns:p14="http://schemas.microsoft.com/office/powerpoint/2010/main" val="1959229043"/>
+      </p:ext>
+    </p:extLst>
+  </p:cSld>
+  <p:clrMapOvr>
+    <a:masterClrMapping/>
+  </p:clrMapOvr>
+  <mc:AlternateContent xmlns:mc="http://schemas.openxmlformats.org/markup-compatibility/2006" xmlns:p14="http://schemas.microsoft.com/office/powerpoint/2010/main">
+    <mc:Choice Requires="p14">
+      <p:transition spd="med" p14:dur="700">
+        <p:fade/>
+      </p:transition>
+    </mc:Choice>
+    <mc:Fallback xmlns="">
+      <p:transition spd="med">
+        <p:fade/>
+      </p:transition>
+    </mc:Fallback>
+  </mc:AlternateContent>
+</p:sld>
+</file>
+
+<file path=ppt/slides/slide9.xml><?xml version="1.0" encoding="utf-8"?>
 <p:sld xmlns:a="http://schemas.openxmlformats.org/drawingml/2006/main" xmlns:r="http://schemas.openxmlformats.org/officeDocument/2006/relationships" xmlns:p="http://schemas.openxmlformats.org/presentationml/2006/main">
   <p:cSld>
     <p:spTree>
@@ -11454,458 +13230,6 @@
     <p:extLst>
       <p:ext uri="{BB962C8B-B14F-4D97-AF65-F5344CB8AC3E}">
         <p14:creationId xmlns:p14="http://schemas.microsoft.com/office/powerpoint/2010/main" val="762081027"/>
-      </p:ext>
-    </p:extLst>
-  </p:cSld>
-  <p:clrMapOvr>
-    <a:masterClrMapping/>
-  </p:clrMapOvr>
-  <mc:AlternateContent xmlns:mc="http://schemas.openxmlformats.org/markup-compatibility/2006" xmlns:p14="http://schemas.microsoft.com/office/powerpoint/2010/main">
-    <mc:Choice Requires="p14">
-      <p:transition spd="med" p14:dur="700">
-        <p:fade/>
-      </p:transition>
-    </mc:Choice>
-    <mc:Fallback xmlns="">
-      <p:transition spd="med">
-        <p:fade/>
-      </p:transition>
-    </mc:Fallback>
-  </mc:AlternateContent>
-</p:sld>
-</file>
-
-<file path=ppt/slides/slide5.xml><?xml version="1.0" encoding="utf-8"?>
-<p:sld xmlns:a="http://schemas.openxmlformats.org/drawingml/2006/main" xmlns:r="http://schemas.openxmlformats.org/officeDocument/2006/relationships" xmlns:p="http://schemas.openxmlformats.org/presentationml/2006/main">
-  <p:cSld>
-    <p:spTree>
-      <p:nvGrpSpPr>
-        <p:cNvPr id="1" name=""/>
-        <p:cNvGrpSpPr/>
-        <p:nvPr/>
-      </p:nvGrpSpPr>
-      <p:grpSpPr>
-        <a:xfrm>
-          <a:off x="0" y="0"/>
-          <a:ext cx="0" cy="0"/>
-          <a:chOff x="0" y="0"/>
-          <a:chExt cx="0" cy="0"/>
-        </a:xfrm>
-      </p:grpSpPr>
-      <p:sp>
-        <p:nvSpPr>
-          <p:cNvPr id="2" name="Title 1"/>
-          <p:cNvSpPr>
-            <a:spLocks noGrp="1"/>
-          </p:cNvSpPr>
-          <p:nvPr>
-            <p:ph type="title"/>
-          </p:nvPr>
-        </p:nvSpPr>
-        <p:spPr/>
-        <p:txBody>
-          <a:bodyPr/>
-          <a:lstStyle/>
-          <a:p>
-            <a:r>
-              <a:rPr lang="en-US" dirty="0"/>
-              <a:t>Two content layout with SmartArt</a:t>
-            </a:r>
-          </a:p>
-        </p:txBody>
-      </p:sp>
-      <p:sp>
-        <p:nvSpPr>
-          <p:cNvPr id="3" name="Content Placeholder 2"/>
-          <p:cNvSpPr>
-            <a:spLocks noGrp="1"/>
-          </p:cNvSpPr>
-          <p:nvPr>
-            <p:ph sz="half" idx="1"/>
-          </p:nvPr>
-        </p:nvSpPr>
-        <p:spPr/>
-        <p:txBody>
-          <a:bodyPr/>
-          <a:lstStyle/>
-          <a:p>
-            <a:r>
-              <a:rPr lang="en-US" dirty="0"/>
-              <a:t>First bullet point here</a:t>
-            </a:r>
-          </a:p>
-          <a:p>
-            <a:r>
-              <a:rPr lang="en-US" dirty="0"/>
-              <a:t>Second bullet point here</a:t>
-            </a:r>
-          </a:p>
-          <a:p>
-            <a:r>
-              <a:rPr lang="en-US" dirty="0"/>
-              <a:t>Third bullet point here</a:t>
-            </a:r>
-          </a:p>
-        </p:txBody>
-      </p:sp>
-      <p:graphicFrame>
-        <p:nvGraphicFramePr>
-          <p:cNvPr id="5" name="Content Placeholder 4" descr="Converging radial diagram showing relationship of 3 steps pointing towards a central goal"/>
-          <p:cNvGraphicFramePr>
-            <a:graphicFrameLocks noGrp="1"/>
-          </p:cNvGraphicFramePr>
-          <p:nvPr>
-            <p:ph sz="half" idx="2"/>
-            <p:extLst>
-              <p:ext uri="{D42A27DB-BD31-4B8C-83A1-F6EECF244321}">
-                <p14:modId xmlns:p14="http://schemas.microsoft.com/office/powerpoint/2010/main" val="1704932073"/>
-              </p:ext>
-            </p:extLst>
-          </p:nvPr>
-        </p:nvGraphicFramePr>
-        <p:xfrm>
-          <a:off x="5089525" y="2160588"/>
-          <a:ext cx="4184650" cy="3881437"/>
-        </p:xfrm>
-        <a:graphic>
-          <a:graphicData uri="http://schemas.openxmlformats.org/drawingml/2006/diagram">
-            <dgm:relIds xmlns:dgm="http://schemas.openxmlformats.org/drawingml/2006/diagram" xmlns:r="http://schemas.openxmlformats.org/officeDocument/2006/relationships" r:dm="rId2" r:lo="rId3" r:qs="rId4" r:cs="rId5"/>
-          </a:graphicData>
-        </a:graphic>
-      </p:graphicFrame>
-    </p:spTree>
-    <p:extLst>
-      <p:ext uri="{BB962C8B-B14F-4D97-AF65-F5344CB8AC3E}">
-        <p14:creationId xmlns:p14="http://schemas.microsoft.com/office/powerpoint/2010/main" val="249977872"/>
-      </p:ext>
-    </p:extLst>
-  </p:cSld>
-  <p:clrMapOvr>
-    <a:masterClrMapping/>
-  </p:clrMapOvr>
-  <mc:AlternateContent xmlns:mc="http://schemas.openxmlformats.org/markup-compatibility/2006" xmlns:p14="http://schemas.microsoft.com/office/powerpoint/2010/main">
-    <mc:Choice Requires="p14">
-      <p:transition spd="med" p14:dur="700">
-        <p:fade/>
-      </p:transition>
-    </mc:Choice>
-    <mc:Fallback xmlns="">
-      <p:transition spd="med">
-        <p:fade/>
-      </p:transition>
-    </mc:Fallback>
-  </mc:AlternateContent>
-</p:sld>
-</file>
-
-<file path=ppt/slides/slide6.xml><?xml version="1.0" encoding="utf-8"?>
-<p:sld xmlns:a="http://schemas.openxmlformats.org/drawingml/2006/main" xmlns:r="http://schemas.openxmlformats.org/officeDocument/2006/relationships" xmlns:p="http://schemas.openxmlformats.org/presentationml/2006/main">
-  <p:cSld>
-    <p:spTree>
-      <p:nvGrpSpPr>
-        <p:cNvPr id="1" name=""/>
-        <p:cNvGrpSpPr/>
-        <p:nvPr/>
-      </p:nvGrpSpPr>
-      <p:grpSpPr>
-        <a:xfrm>
-          <a:off x="0" y="0"/>
-          <a:ext cx="0" cy="0"/>
-          <a:chOff x="0" y="0"/>
-          <a:chExt cx="0" cy="0"/>
-        </a:xfrm>
-      </p:grpSpPr>
-      <p:sp>
-        <p:nvSpPr>
-          <p:cNvPr id="4" name="Title 3"/>
-          <p:cNvSpPr>
-            <a:spLocks noGrp="1"/>
-          </p:cNvSpPr>
-          <p:nvPr>
-            <p:ph type="title"/>
-          </p:nvPr>
-        </p:nvSpPr>
-        <p:spPr/>
-        <p:txBody>
-          <a:bodyPr/>
-          <a:lstStyle/>
-          <a:p>
-            <a:r>
-              <a:rPr lang="en-US" dirty="0"/>
-              <a:t>Add a Slide Title - 1</a:t>
-            </a:r>
-          </a:p>
-        </p:txBody>
-      </p:sp>
-      <p:sp>
-        <p:nvSpPr>
-          <p:cNvPr id="2" name="Text Placeholder 1"/>
-          <p:cNvSpPr>
-            <a:spLocks noGrp="1"/>
-          </p:cNvSpPr>
-          <p:nvPr>
-            <p:ph type="body" idx="1"/>
-          </p:nvPr>
-        </p:nvSpPr>
-        <p:spPr/>
-        <p:txBody>
-          <a:bodyPr/>
-          <a:lstStyle/>
-          <a:p>
-            <a:endParaRPr lang="en-US" dirty="0"/>
-          </a:p>
-        </p:txBody>
-      </p:sp>
-    </p:spTree>
-    <p:extLst>
-      <p:ext uri="{BB962C8B-B14F-4D97-AF65-F5344CB8AC3E}">
-        <p14:creationId xmlns:p14="http://schemas.microsoft.com/office/powerpoint/2010/main" val="3999759775"/>
-      </p:ext>
-    </p:extLst>
-  </p:cSld>
-  <p:clrMapOvr>
-    <a:masterClrMapping/>
-  </p:clrMapOvr>
-  <mc:AlternateContent xmlns:mc="http://schemas.openxmlformats.org/markup-compatibility/2006" xmlns:p14="http://schemas.microsoft.com/office/powerpoint/2010/main">
-    <mc:Choice Requires="p14">
-      <p:transition spd="med" p14:dur="700">
-        <p:fade/>
-      </p:transition>
-    </mc:Choice>
-    <mc:Fallback xmlns="">
-      <p:transition spd="med">
-        <p:fade/>
-      </p:transition>
-    </mc:Fallback>
-  </mc:AlternateContent>
-</p:sld>
-</file>
-
-<file path=ppt/slides/slide7.xml><?xml version="1.0" encoding="utf-8"?>
-<p:sld xmlns:a="http://schemas.openxmlformats.org/drawingml/2006/main" xmlns:r="http://schemas.openxmlformats.org/officeDocument/2006/relationships" xmlns:p="http://schemas.openxmlformats.org/presentationml/2006/main">
-  <p:cSld>
-    <p:spTree>
-      <p:nvGrpSpPr>
-        <p:cNvPr id="1" name=""/>
-        <p:cNvGrpSpPr/>
-        <p:nvPr/>
-      </p:nvGrpSpPr>
-      <p:grpSpPr>
-        <a:xfrm>
-          <a:off x="0" y="0"/>
-          <a:ext cx="0" cy="0"/>
-          <a:chOff x="0" y="0"/>
-          <a:chExt cx="0" cy="0"/>
-        </a:xfrm>
-      </p:grpSpPr>
-      <p:sp>
-        <p:nvSpPr>
-          <p:cNvPr id="12" name="Title 11"/>
-          <p:cNvSpPr>
-            <a:spLocks noGrp="1"/>
-          </p:cNvSpPr>
-          <p:nvPr>
-            <p:ph type="title"/>
-          </p:nvPr>
-        </p:nvSpPr>
-        <p:spPr/>
-        <p:txBody>
-          <a:bodyPr/>
-          <a:lstStyle/>
-          <a:p>
-            <a:r>
-              <a:rPr lang="en-US" dirty="0"/>
-              <a:t>Add a Slide Title - 2</a:t>
-            </a:r>
-          </a:p>
-        </p:txBody>
-      </p:sp>
-      <p:sp>
-        <p:nvSpPr>
-          <p:cNvPr id="13" name="Text Placeholder 12"/>
-          <p:cNvSpPr>
-            <a:spLocks noGrp="1"/>
-          </p:cNvSpPr>
-          <p:nvPr>
-            <p:ph type="body" idx="1"/>
-          </p:nvPr>
-        </p:nvSpPr>
-        <p:spPr/>
-        <p:txBody>
-          <a:bodyPr/>
-          <a:lstStyle/>
-          <a:p>
-            <a:endParaRPr lang="en-US" dirty="0"/>
-          </a:p>
-        </p:txBody>
-      </p:sp>
-      <p:sp>
-        <p:nvSpPr>
-          <p:cNvPr id="14" name="Content Placeholder 13"/>
-          <p:cNvSpPr>
-            <a:spLocks noGrp="1"/>
-          </p:cNvSpPr>
-          <p:nvPr>
-            <p:ph sz="half" idx="2"/>
-          </p:nvPr>
-        </p:nvSpPr>
-        <p:spPr/>
-        <p:txBody>
-          <a:bodyPr/>
-          <a:lstStyle/>
-          <a:p>
-            <a:endParaRPr lang="en-US" dirty="0"/>
-          </a:p>
-        </p:txBody>
-      </p:sp>
-      <p:sp>
-        <p:nvSpPr>
-          <p:cNvPr id="15" name="Text Placeholder 14"/>
-          <p:cNvSpPr>
-            <a:spLocks noGrp="1"/>
-          </p:cNvSpPr>
-          <p:nvPr>
-            <p:ph type="body" sz="quarter" idx="3"/>
-          </p:nvPr>
-        </p:nvSpPr>
-        <p:spPr/>
-        <p:txBody>
-          <a:bodyPr/>
-          <a:lstStyle/>
-          <a:p>
-            <a:endParaRPr lang="en-US" dirty="0"/>
-          </a:p>
-        </p:txBody>
-      </p:sp>
-      <p:sp>
-        <p:nvSpPr>
-          <p:cNvPr id="16" name="Content Placeholder 15"/>
-          <p:cNvSpPr>
-            <a:spLocks noGrp="1"/>
-          </p:cNvSpPr>
-          <p:nvPr>
-            <p:ph sz="quarter" idx="4"/>
-          </p:nvPr>
-        </p:nvSpPr>
-        <p:spPr/>
-        <p:txBody>
-          <a:bodyPr/>
-          <a:lstStyle/>
-          <a:p>
-            <a:endParaRPr lang="en-US" dirty="0"/>
-          </a:p>
-        </p:txBody>
-      </p:sp>
-    </p:spTree>
-    <p:extLst>
-      <p:ext uri="{BB962C8B-B14F-4D97-AF65-F5344CB8AC3E}">
-        <p14:creationId xmlns:p14="http://schemas.microsoft.com/office/powerpoint/2010/main" val="1428607047"/>
-      </p:ext>
-    </p:extLst>
-  </p:cSld>
-  <p:clrMapOvr>
-    <a:masterClrMapping/>
-  </p:clrMapOvr>
-  <mc:AlternateContent xmlns:mc="http://schemas.openxmlformats.org/markup-compatibility/2006" xmlns:p14="http://schemas.microsoft.com/office/powerpoint/2010/main">
-    <mc:Choice Requires="p14">
-      <p:transition spd="med" p14:dur="700">
-        <p:fade/>
-      </p:transition>
-    </mc:Choice>
-    <mc:Fallback xmlns="">
-      <p:transition spd="med">
-        <p:fade/>
-      </p:transition>
-    </mc:Fallback>
-  </mc:AlternateContent>
-</p:sld>
-</file>
-
-<file path=ppt/slides/slide8.xml><?xml version="1.0" encoding="utf-8"?>
-<p:sld xmlns:a="http://schemas.openxmlformats.org/drawingml/2006/main" xmlns:r="http://schemas.openxmlformats.org/officeDocument/2006/relationships" xmlns:p="http://schemas.openxmlformats.org/presentationml/2006/main">
-  <p:cSld>
-    <p:spTree>
-      <p:nvGrpSpPr>
-        <p:cNvPr id="1" name=""/>
-        <p:cNvGrpSpPr/>
-        <p:nvPr/>
-      </p:nvGrpSpPr>
-      <p:grpSpPr>
-        <a:xfrm>
-          <a:off x="0" y="0"/>
-          <a:ext cx="0" cy="0"/>
-          <a:chOff x="0" y="0"/>
-          <a:chExt cx="0" cy="0"/>
-        </a:xfrm>
-      </p:grpSpPr>
-      <p:sp>
-        <p:nvSpPr>
-          <p:cNvPr id="4" name="Title 3"/>
-          <p:cNvSpPr>
-            <a:spLocks noGrp="1"/>
-          </p:cNvSpPr>
-          <p:nvPr>
-            <p:ph type="title"/>
-          </p:nvPr>
-        </p:nvSpPr>
-        <p:spPr/>
-        <p:txBody>
-          <a:bodyPr/>
-          <a:lstStyle/>
-          <a:p>
-            <a:r>
-              <a:rPr lang="en-US" dirty="0"/>
-              <a:t>Add a Slide Title - 3</a:t>
-            </a:r>
-          </a:p>
-        </p:txBody>
-      </p:sp>
-    </p:spTree>
-    <p:extLst>
-      <p:ext uri="{BB962C8B-B14F-4D97-AF65-F5344CB8AC3E}">
-        <p14:creationId xmlns:p14="http://schemas.microsoft.com/office/powerpoint/2010/main" val="3757355931"/>
-      </p:ext>
-    </p:extLst>
-  </p:cSld>
-  <p:clrMapOvr>
-    <a:masterClrMapping/>
-  </p:clrMapOvr>
-  <mc:AlternateContent xmlns:mc="http://schemas.openxmlformats.org/markup-compatibility/2006" xmlns:p14="http://schemas.microsoft.com/office/powerpoint/2010/main">
-    <mc:Choice Requires="p14">
-      <p:transition spd="med" p14:dur="700">
-        <p:fade/>
-      </p:transition>
-    </mc:Choice>
-    <mc:Fallback xmlns="">
-      <p:transition spd="med">
-        <p:fade/>
-      </p:transition>
-    </mc:Fallback>
-  </mc:AlternateContent>
-</p:sld>
-</file>
-
-<file path=ppt/slides/slide9.xml><?xml version="1.0" encoding="utf-8"?>
-<p:sld xmlns:a="http://schemas.openxmlformats.org/drawingml/2006/main" xmlns:r="http://schemas.openxmlformats.org/officeDocument/2006/relationships" xmlns:p="http://schemas.openxmlformats.org/presentationml/2006/main">
-  <p:cSld>
-    <p:spTree>
-      <p:nvGrpSpPr>
-        <p:cNvPr id="1" name=""/>
-        <p:cNvGrpSpPr/>
-        <p:nvPr/>
-      </p:nvGrpSpPr>
-      <p:grpSpPr>
-        <a:xfrm>
-          <a:off x="0" y="0"/>
-          <a:ext cx="0" cy="0"/>
-          <a:chOff x="0" y="0"/>
-          <a:chExt cx="0" cy="0"/>
-        </a:xfrm>
-      </p:grpSpPr>
-    </p:spTree>
-    <p:extLst>
-      <p:ext uri="{BB962C8B-B14F-4D97-AF65-F5344CB8AC3E}">
-        <p14:creationId xmlns:p14="http://schemas.microsoft.com/office/powerpoint/2010/main" val="726169185"/>
       </p:ext>
     </p:extLst>
   </p:cSld>

</xml_diff>